<commit_message>
updated figure and equation
</commit_message>
<xml_diff>
--- a/chapters/chapter03_geometricmodel/figures/figures_PPT.pptx
+++ b/chapters/chapter03_geometricmodel/figures/figures_PPT.pptx
@@ -247,7 +247,7 @@
           <a:p>
             <a:fld id="{D25EE769-EC14-4089-BCC7-B0C4A40ED0F9}" type="datetimeFigureOut">
               <a:rPr lang="en-US" smtClean="0"/>
-              <a:t>9/15/2015</a:t>
+              <a:t>9/17/2015</a:t>
             </a:fld>
             <a:endParaRPr lang="en-US"/>
           </a:p>
@@ -417,7 +417,7 @@
           <a:p>
             <a:fld id="{D25EE769-EC14-4089-BCC7-B0C4A40ED0F9}" type="datetimeFigureOut">
               <a:rPr lang="en-US" smtClean="0"/>
-              <a:t>9/15/2015</a:t>
+              <a:t>9/17/2015</a:t>
             </a:fld>
             <a:endParaRPr lang="en-US"/>
           </a:p>
@@ -597,7 +597,7 @@
           <a:p>
             <a:fld id="{D25EE769-EC14-4089-BCC7-B0C4A40ED0F9}" type="datetimeFigureOut">
               <a:rPr lang="en-US" smtClean="0"/>
-              <a:t>9/15/2015</a:t>
+              <a:t>9/17/2015</a:t>
             </a:fld>
             <a:endParaRPr lang="en-US"/>
           </a:p>
@@ -767,7 +767,7 @@
           <a:p>
             <a:fld id="{D25EE769-EC14-4089-BCC7-B0C4A40ED0F9}" type="datetimeFigureOut">
               <a:rPr lang="en-US" smtClean="0"/>
-              <a:t>9/15/2015</a:t>
+              <a:t>9/17/2015</a:t>
             </a:fld>
             <a:endParaRPr lang="en-US"/>
           </a:p>
@@ -1011,7 +1011,7 @@
           <a:p>
             <a:fld id="{D25EE769-EC14-4089-BCC7-B0C4A40ED0F9}" type="datetimeFigureOut">
               <a:rPr lang="en-US" smtClean="0"/>
-              <a:t>9/15/2015</a:t>
+              <a:t>9/17/2015</a:t>
             </a:fld>
             <a:endParaRPr lang="en-US"/>
           </a:p>
@@ -1243,7 +1243,7 @@
           <a:p>
             <a:fld id="{D25EE769-EC14-4089-BCC7-B0C4A40ED0F9}" type="datetimeFigureOut">
               <a:rPr lang="en-US" smtClean="0"/>
-              <a:t>9/15/2015</a:t>
+              <a:t>9/17/2015</a:t>
             </a:fld>
             <a:endParaRPr lang="en-US"/>
           </a:p>
@@ -1610,7 +1610,7 @@
           <a:p>
             <a:fld id="{D25EE769-EC14-4089-BCC7-B0C4A40ED0F9}" type="datetimeFigureOut">
               <a:rPr lang="en-US" smtClean="0"/>
-              <a:t>9/15/2015</a:t>
+              <a:t>9/17/2015</a:t>
             </a:fld>
             <a:endParaRPr lang="en-US"/>
           </a:p>
@@ -1728,7 +1728,7 @@
           <a:p>
             <a:fld id="{D25EE769-EC14-4089-BCC7-B0C4A40ED0F9}" type="datetimeFigureOut">
               <a:rPr lang="en-US" smtClean="0"/>
-              <a:t>9/15/2015</a:t>
+              <a:t>9/17/2015</a:t>
             </a:fld>
             <a:endParaRPr lang="en-US"/>
           </a:p>
@@ -1823,7 +1823,7 @@
           <a:p>
             <a:fld id="{D25EE769-EC14-4089-BCC7-B0C4A40ED0F9}" type="datetimeFigureOut">
               <a:rPr lang="en-US" smtClean="0"/>
-              <a:t>9/15/2015</a:t>
+              <a:t>9/17/2015</a:t>
             </a:fld>
             <a:endParaRPr lang="en-US"/>
           </a:p>
@@ -2100,7 +2100,7 @@
           <a:p>
             <a:fld id="{D25EE769-EC14-4089-BCC7-B0C4A40ED0F9}" type="datetimeFigureOut">
               <a:rPr lang="en-US" smtClean="0"/>
-              <a:t>9/15/2015</a:t>
+              <a:t>9/17/2015</a:t>
             </a:fld>
             <a:endParaRPr lang="en-US"/>
           </a:p>
@@ -2357,7 +2357,7 @@
           <a:p>
             <a:fld id="{D25EE769-EC14-4089-BCC7-B0C4A40ED0F9}" type="datetimeFigureOut">
               <a:rPr lang="en-US" smtClean="0"/>
-              <a:t>9/15/2015</a:t>
+              <a:t>9/17/2015</a:t>
             </a:fld>
             <a:endParaRPr lang="en-US"/>
           </a:p>
@@ -2570,7 +2570,7 @@
           <a:p>
             <a:fld id="{D25EE769-EC14-4089-BCC7-B0C4A40ED0F9}" type="datetimeFigureOut">
               <a:rPr lang="en-US" smtClean="0"/>
-              <a:t>9/15/2015</a:t>
+              <a:t>9/17/2015</a:t>
             </a:fld>
             <a:endParaRPr lang="en-US"/>
           </a:p>
@@ -14141,8 +14141,8 @@
             </a:prstGeom>
           </p:spPr>
         </p:pic>
-        <mc:AlternateContent xmlns:mc="http://schemas.openxmlformats.org/markup-compatibility/2006">
-          <mc:Choice xmlns:a14="http://schemas.microsoft.com/office/drawing/2010/main" Requires="a14">
+        <mc:AlternateContent xmlns:mc="http://schemas.openxmlformats.org/markup-compatibility/2006" xmlns:a14="http://schemas.microsoft.com/office/drawing/2010/main">
+          <mc:Choice Requires="a14">
             <p:sp>
               <p:nvSpPr>
                 <p:cNvPr id="147" name="Text Box 15"/>
@@ -14224,7 +14224,7 @@
               </p:txBody>
             </p:sp>
           </mc:Choice>
-          <mc:Fallback>
+          <mc:Fallback xmlns="">
             <p:sp>
               <p:nvSpPr>
                 <p:cNvPr id="147" name="Text Box 15"/>
@@ -14267,8 +14267,8 @@
             </p:sp>
           </mc:Fallback>
         </mc:AlternateContent>
-        <mc:AlternateContent xmlns:mc="http://schemas.openxmlformats.org/markup-compatibility/2006">
-          <mc:Choice xmlns:a14="http://schemas.microsoft.com/office/drawing/2010/main" Requires="a14">
+        <mc:AlternateContent xmlns:mc="http://schemas.openxmlformats.org/markup-compatibility/2006" xmlns:a14="http://schemas.microsoft.com/office/drawing/2010/main">
+          <mc:Choice Requires="a14">
             <p:sp>
               <p:nvSpPr>
                 <p:cNvPr id="148" name="Text Box 15"/>
@@ -14359,7 +14359,7 @@
               </p:txBody>
             </p:sp>
           </mc:Choice>
-          <mc:Fallback>
+          <mc:Fallback xmlns="">
             <p:sp>
               <p:nvSpPr>
                 <p:cNvPr id="148" name="Text Box 15"/>
@@ -14450,8 +14450,8 @@
             </a:p>
           </p:txBody>
         </p:sp>
-        <mc:AlternateContent xmlns:mc="http://schemas.openxmlformats.org/markup-compatibility/2006">
-          <mc:Choice xmlns:a14="http://schemas.microsoft.com/office/drawing/2010/main" Requires="a14">
+        <mc:AlternateContent xmlns:mc="http://schemas.openxmlformats.org/markup-compatibility/2006" xmlns:a14="http://schemas.microsoft.com/office/drawing/2010/main">
+          <mc:Choice Requires="a14">
             <p:sp>
               <p:nvSpPr>
                 <p:cNvPr id="150" name="TextBox 149"/>
@@ -14495,7 +14495,7 @@
               </p:txBody>
             </p:sp>
           </mc:Choice>
-          <mc:Fallback>
+          <mc:Fallback xmlns="">
             <p:sp>
               <p:nvSpPr>
                 <p:cNvPr id="150" name="TextBox 149"/>
@@ -14534,8 +14534,8 @@
             </p:sp>
           </mc:Fallback>
         </mc:AlternateContent>
-        <mc:AlternateContent xmlns:mc="http://schemas.openxmlformats.org/markup-compatibility/2006">
-          <mc:Choice xmlns:a14="http://schemas.microsoft.com/office/drawing/2010/main" Requires="a14">
+        <mc:AlternateContent xmlns:mc="http://schemas.openxmlformats.org/markup-compatibility/2006" xmlns:a14="http://schemas.microsoft.com/office/drawing/2010/main">
+          <mc:Choice Requires="a14">
             <p:sp>
               <p:nvSpPr>
                 <p:cNvPr id="151" name="TextBox 150"/>
@@ -14585,7 +14585,7 @@
               </p:txBody>
             </p:sp>
           </mc:Choice>
-          <mc:Fallback>
+          <mc:Fallback xmlns="">
             <p:sp>
               <p:nvSpPr>
                 <p:cNvPr id="151" name="TextBox 150"/>
@@ -14759,8 +14759,8 @@
             </a:p>
           </p:txBody>
         </p:sp>
-        <mc:AlternateContent xmlns:mc="http://schemas.openxmlformats.org/markup-compatibility/2006">
-          <mc:Choice xmlns:a14="http://schemas.microsoft.com/office/drawing/2010/main" Requires="a14">
+        <mc:AlternateContent xmlns:mc="http://schemas.openxmlformats.org/markup-compatibility/2006" xmlns:a14="http://schemas.microsoft.com/office/drawing/2010/main">
+          <mc:Choice Requires="a14">
             <p:sp>
               <p:nvSpPr>
                 <p:cNvPr id="155" name="TextBox 154"/>
@@ -14921,7 +14921,7 @@
               </p:txBody>
             </p:sp>
           </mc:Choice>
-          <mc:Fallback>
+          <mc:Fallback xmlns="">
             <p:sp>
               <p:nvSpPr>
                 <p:cNvPr id="155" name="TextBox 154"/>
@@ -14960,8 +14960,8 @@
             </p:sp>
           </mc:Fallback>
         </mc:AlternateContent>
-        <mc:AlternateContent xmlns:mc="http://schemas.openxmlformats.org/markup-compatibility/2006">
-          <mc:Choice xmlns:a14="http://schemas.microsoft.com/office/drawing/2010/main" Requires="a14">
+        <mc:AlternateContent xmlns:mc="http://schemas.openxmlformats.org/markup-compatibility/2006" xmlns:a14="http://schemas.microsoft.com/office/drawing/2010/main">
+          <mc:Choice Requires="a14">
             <p:sp>
               <p:nvSpPr>
                 <p:cNvPr id="156" name="TextBox 155"/>
@@ -15173,7 +15173,7 @@
               </p:txBody>
             </p:sp>
           </mc:Choice>
-          <mc:Fallback>
+          <mc:Fallback xmlns="">
             <p:sp>
               <p:nvSpPr>
                 <p:cNvPr id="156" name="TextBox 155"/>
@@ -15263,8 +15263,8 @@
             </a:p>
           </p:txBody>
         </p:sp>
-        <mc:AlternateContent xmlns:mc="http://schemas.openxmlformats.org/markup-compatibility/2006">
-          <mc:Choice xmlns:a14="http://schemas.microsoft.com/office/drawing/2010/main" Requires="a14">
+        <mc:AlternateContent xmlns:mc="http://schemas.openxmlformats.org/markup-compatibility/2006" xmlns:a14="http://schemas.microsoft.com/office/drawing/2010/main">
+          <mc:Choice Requires="a14">
             <p:sp>
               <p:nvSpPr>
                 <p:cNvPr id="158" name="TextBox 157"/>
@@ -15397,7 +15397,7 @@
               </p:txBody>
             </p:sp>
           </mc:Choice>
-          <mc:Fallback>
+          <mc:Fallback xmlns="">
             <p:sp>
               <p:nvSpPr>
                 <p:cNvPr id="158" name="TextBox 157"/>
@@ -15625,8 +15625,8 @@
             </p:txBody>
           </p:sp>
         </p:grpSp>
-        <mc:AlternateContent xmlns:mc="http://schemas.openxmlformats.org/markup-compatibility/2006">
-          <mc:Choice xmlns:a14="http://schemas.microsoft.com/office/drawing/2010/main" Requires="a14">
+        <mc:AlternateContent xmlns:mc="http://schemas.openxmlformats.org/markup-compatibility/2006" xmlns:a14="http://schemas.microsoft.com/office/drawing/2010/main">
+          <mc:Choice Requires="a14">
             <p:sp>
               <p:nvSpPr>
                 <p:cNvPr id="168" name="TextBox 167"/>
@@ -15683,7 +15683,7 @@
               </p:txBody>
             </p:sp>
           </mc:Choice>
-          <mc:Fallback>
+          <mc:Fallback xmlns="">
             <p:sp>
               <p:nvSpPr>
                 <p:cNvPr id="168" name="TextBox 167"/>
@@ -15814,8 +15814,8 @@
             </p:style>
           </p:cxnSp>
         </p:grpSp>
-        <mc:AlternateContent xmlns:mc="http://schemas.openxmlformats.org/markup-compatibility/2006">
-          <mc:Choice xmlns:a14="http://schemas.microsoft.com/office/drawing/2010/main" Requires="a14">
+        <mc:AlternateContent xmlns:mc="http://schemas.openxmlformats.org/markup-compatibility/2006" xmlns:a14="http://schemas.microsoft.com/office/drawing/2010/main">
+          <mc:Choice Requires="a14">
             <p:sp>
               <p:nvSpPr>
                 <p:cNvPr id="173" name="TextBox 172"/>
@@ -15862,7 +15862,7 @@
               </p:txBody>
             </p:sp>
           </mc:Choice>
-          <mc:Fallback>
+          <mc:Fallback xmlns="">
             <p:sp>
               <p:nvSpPr>
                 <p:cNvPr id="173" name="TextBox 172"/>
@@ -28731,8 +28731,8 @@
             </a:prstGeom>
           </p:spPr>
         </p:pic>
-        <mc:AlternateContent xmlns:mc="http://schemas.openxmlformats.org/markup-compatibility/2006">
-          <mc:Choice xmlns:a14="http://schemas.microsoft.com/office/drawing/2010/main" Requires="a14">
+        <mc:AlternateContent xmlns:mc="http://schemas.openxmlformats.org/markup-compatibility/2006" xmlns:a14="http://schemas.microsoft.com/office/drawing/2010/main">
+          <mc:Choice Requires="a14">
             <p:sp>
               <p:nvSpPr>
                 <p:cNvPr id="228" name="Text Box 15"/>
@@ -28816,7 +28816,7 @@
               </p:txBody>
             </p:sp>
           </mc:Choice>
-          <mc:Fallback>
+          <mc:Fallback xmlns="">
             <p:sp>
               <p:nvSpPr>
                 <p:cNvPr id="228" name="Text Box 15"/>
@@ -28859,8 +28859,8 @@
             </p:sp>
           </mc:Fallback>
         </mc:AlternateContent>
-        <mc:AlternateContent xmlns:mc="http://schemas.openxmlformats.org/markup-compatibility/2006">
-          <mc:Choice xmlns:a14="http://schemas.microsoft.com/office/drawing/2010/main" Requires="a14">
+        <mc:AlternateContent xmlns:mc="http://schemas.openxmlformats.org/markup-compatibility/2006" xmlns:a14="http://schemas.microsoft.com/office/drawing/2010/main">
+          <mc:Choice Requires="a14">
             <p:sp>
               <p:nvSpPr>
                 <p:cNvPr id="229" name="Text Box 15"/>
@@ -28953,7 +28953,7 @@
               </p:txBody>
             </p:sp>
           </mc:Choice>
-          <mc:Fallback>
+          <mc:Fallback xmlns="">
             <p:sp>
               <p:nvSpPr>
                 <p:cNvPr id="229" name="Text Box 15"/>
@@ -29044,8 +29044,8 @@
             </a:p>
           </p:txBody>
         </p:sp>
-        <mc:AlternateContent xmlns:mc="http://schemas.openxmlformats.org/markup-compatibility/2006">
-          <mc:Choice xmlns:a14="http://schemas.microsoft.com/office/drawing/2010/main" Requires="a14">
+        <mc:AlternateContent xmlns:mc="http://schemas.openxmlformats.org/markup-compatibility/2006" xmlns:a14="http://schemas.microsoft.com/office/drawing/2010/main">
+          <mc:Choice Requires="a14">
             <p:sp>
               <p:nvSpPr>
                 <p:cNvPr id="231" name="TextBox 230"/>
@@ -29089,7 +29089,7 @@
               </p:txBody>
             </p:sp>
           </mc:Choice>
-          <mc:Fallback>
+          <mc:Fallback xmlns="">
             <p:sp>
               <p:nvSpPr>
                 <p:cNvPr id="231" name="TextBox 230"/>
@@ -29128,8 +29128,8 @@
             </p:sp>
           </mc:Fallback>
         </mc:AlternateContent>
-        <mc:AlternateContent xmlns:mc="http://schemas.openxmlformats.org/markup-compatibility/2006">
-          <mc:Choice xmlns:a14="http://schemas.microsoft.com/office/drawing/2010/main" Requires="a14">
+        <mc:AlternateContent xmlns:mc="http://schemas.openxmlformats.org/markup-compatibility/2006" xmlns:a14="http://schemas.microsoft.com/office/drawing/2010/main">
+          <mc:Choice Requires="a14">
             <p:sp>
               <p:nvSpPr>
                 <p:cNvPr id="232" name="TextBox 231"/>
@@ -29179,7 +29179,7 @@
               </p:txBody>
             </p:sp>
           </mc:Choice>
-          <mc:Fallback>
+          <mc:Fallback xmlns="">
             <p:sp>
               <p:nvSpPr>
                 <p:cNvPr id="232" name="TextBox 231"/>
@@ -29323,8 +29323,8 @@
             </a:p>
           </p:txBody>
         </p:sp>
-        <mc:AlternateContent xmlns:mc="http://schemas.openxmlformats.org/markup-compatibility/2006">
-          <mc:Choice xmlns:a14="http://schemas.microsoft.com/office/drawing/2010/main" Requires="a14">
+        <mc:AlternateContent xmlns:mc="http://schemas.openxmlformats.org/markup-compatibility/2006" xmlns:a14="http://schemas.microsoft.com/office/drawing/2010/main">
+          <mc:Choice Requires="a14">
             <p:sp>
               <p:nvSpPr>
                 <p:cNvPr id="235" name="TextBox 234"/>
@@ -29485,7 +29485,7 @@
               </p:txBody>
             </p:sp>
           </mc:Choice>
-          <mc:Fallback>
+          <mc:Fallback xmlns="">
             <p:sp>
               <p:nvSpPr>
                 <p:cNvPr id="235" name="TextBox 234"/>
@@ -29524,8 +29524,8 @@
             </p:sp>
           </mc:Fallback>
         </mc:AlternateContent>
-        <mc:AlternateContent xmlns:mc="http://schemas.openxmlformats.org/markup-compatibility/2006">
-          <mc:Choice xmlns:a14="http://schemas.microsoft.com/office/drawing/2010/main" Requires="a14">
+        <mc:AlternateContent xmlns:mc="http://schemas.openxmlformats.org/markup-compatibility/2006" xmlns:a14="http://schemas.microsoft.com/office/drawing/2010/main">
+          <mc:Choice Requires="a14">
             <p:sp>
               <p:nvSpPr>
                 <p:cNvPr id="236" name="TextBox 235"/>
@@ -29737,7 +29737,7 @@
               </p:txBody>
             </p:sp>
           </mc:Choice>
-          <mc:Fallback>
+          <mc:Fallback xmlns="">
             <p:sp>
               <p:nvSpPr>
                 <p:cNvPr id="236" name="TextBox 235"/>
@@ -29827,8 +29827,8 @@
             </a:p>
           </p:txBody>
         </p:sp>
-        <mc:AlternateContent xmlns:mc="http://schemas.openxmlformats.org/markup-compatibility/2006">
-          <mc:Choice xmlns:a14="http://schemas.microsoft.com/office/drawing/2010/main" Requires="a14">
+        <mc:AlternateContent xmlns:mc="http://schemas.openxmlformats.org/markup-compatibility/2006" xmlns:a14="http://schemas.microsoft.com/office/drawing/2010/main">
+          <mc:Choice Requires="a14">
             <p:sp>
               <p:nvSpPr>
                 <p:cNvPr id="238" name="TextBox 237"/>
@@ -29961,7 +29961,7 @@
               </p:txBody>
             </p:sp>
           </mc:Choice>
-          <mc:Fallback>
+          <mc:Fallback xmlns="">
             <p:sp>
               <p:nvSpPr>
                 <p:cNvPr id="238" name="TextBox 237"/>
@@ -30189,8 +30189,8 @@
             </p:txBody>
           </p:sp>
         </p:grpSp>
-        <mc:AlternateContent xmlns:mc="http://schemas.openxmlformats.org/markup-compatibility/2006">
-          <mc:Choice xmlns:a14="http://schemas.microsoft.com/office/drawing/2010/main" Requires="a14">
+        <mc:AlternateContent xmlns:mc="http://schemas.openxmlformats.org/markup-compatibility/2006" xmlns:a14="http://schemas.microsoft.com/office/drawing/2010/main">
+          <mc:Choice Requires="a14">
             <p:sp>
               <p:nvSpPr>
                 <p:cNvPr id="242" name="TextBox 241"/>
@@ -30247,7 +30247,7 @@
               </p:txBody>
             </p:sp>
           </mc:Choice>
-          <mc:Fallback>
+          <mc:Fallback xmlns="">
             <p:sp>
               <p:nvSpPr>
                 <p:cNvPr id="242" name="TextBox 241"/>
@@ -30378,8 +30378,8 @@
             </p:style>
           </p:cxnSp>
         </p:grpSp>
-        <mc:AlternateContent xmlns:mc="http://schemas.openxmlformats.org/markup-compatibility/2006">
-          <mc:Choice xmlns:a14="http://schemas.microsoft.com/office/drawing/2010/main" Requires="a14">
+        <mc:AlternateContent xmlns:mc="http://schemas.openxmlformats.org/markup-compatibility/2006" xmlns:a14="http://schemas.microsoft.com/office/drawing/2010/main">
+          <mc:Choice Requires="a14">
             <p:sp>
               <p:nvSpPr>
                 <p:cNvPr id="245" name="TextBox 244"/>
@@ -30426,7 +30426,7 @@
               </p:txBody>
             </p:sp>
           </mc:Choice>
-          <mc:Fallback>
+          <mc:Fallback xmlns="">
             <p:sp>
               <p:nvSpPr>
                 <p:cNvPr id="245" name="TextBox 244"/>
@@ -35595,16 +35595,16 @@
       </p:grpSp>
       <p:grpSp>
         <p:nvGrpSpPr>
-          <p:cNvPr id="10" name="Group 9"/>
+          <p:cNvPr id="7" name="Group 6"/>
           <p:cNvGrpSpPr/>
           <p:nvPr/>
         </p:nvGrpSpPr>
         <p:grpSpPr>
           <a:xfrm>
             <a:off x="190612" y="3833813"/>
-            <a:ext cx="4982128" cy="2028825"/>
+            <a:ext cx="4982128" cy="2075920"/>
             <a:chOff x="190612" y="3833813"/>
-            <a:chExt cx="4982128" cy="2028825"/>
+            <a:chExt cx="4982128" cy="2075920"/>
           </a:xfrm>
         </p:grpSpPr>
         <p:sp>
@@ -35616,7 +35616,7 @@
           <p:spPr>
             <a:xfrm>
               <a:off x="285750" y="3833813"/>
-              <a:ext cx="4824413" cy="2028825"/>
+              <a:ext cx="4824413" cy="2075920"/>
             </a:xfrm>
             <a:prstGeom prst="rect">
               <a:avLst/>
@@ -35653,6 +35653,44 @@
             </a:p>
           </p:txBody>
         </p:sp>
+        <p:cxnSp>
+          <p:nvCxnSpPr>
+            <p:cNvPr id="173" name="Straight Connector 172"/>
+            <p:cNvCxnSpPr/>
+            <p:nvPr/>
+          </p:nvCxnSpPr>
+          <p:spPr>
+            <a:xfrm flipH="1" flipV="1">
+              <a:off x="4718073" y="4834136"/>
+              <a:ext cx="0" cy="1005840"/>
+            </a:xfrm>
+            <a:prstGeom prst="line">
+              <a:avLst/>
+            </a:prstGeom>
+            <a:ln>
+              <a:solidFill>
+                <a:schemeClr val="bg1">
+                  <a:lumMod val="50000"/>
+                </a:schemeClr>
+              </a:solidFill>
+              <a:prstDash val="dash"/>
+            </a:ln>
+          </p:spPr>
+          <p:style>
+            <a:lnRef idx="1">
+              <a:schemeClr val="accent1"/>
+            </a:lnRef>
+            <a:fillRef idx="0">
+              <a:schemeClr val="accent1"/>
+            </a:fillRef>
+            <a:effectRef idx="0">
+              <a:schemeClr val="accent1"/>
+            </a:effectRef>
+            <a:fontRef idx="minor">
+              <a:schemeClr val="tx1"/>
+            </a:fontRef>
+          </p:style>
+        </p:cxnSp>
         <p:cxnSp>
           <p:nvCxnSpPr>
             <p:cNvPr id="198" name="Straight Connector 197"/>
@@ -36239,7 +36277,7 @@
           <p:spPr>
             <a:xfrm flipH="1" flipV="1">
               <a:off x="2949490" y="4799005"/>
-              <a:ext cx="0" cy="914400"/>
+              <a:ext cx="0" cy="1060704"/>
             </a:xfrm>
             <a:prstGeom prst="line">
               <a:avLst/>
@@ -36767,7 +36805,7 @@
           </p:blipFill>
           <p:spPr>
             <a:xfrm>
-              <a:off x="301294" y="5393004"/>
+              <a:off x="301294" y="5503062"/>
               <a:ext cx="443831" cy="347472"/>
             </a:xfrm>
             <a:prstGeom prst="rect">
@@ -36775,8 +36813,8 @@
             </a:prstGeom>
           </p:spPr>
         </p:pic>
-        <mc:AlternateContent xmlns:mc="http://schemas.openxmlformats.org/markup-compatibility/2006" xmlns:a14="http://schemas.microsoft.com/office/drawing/2010/main">
-          <mc:Choice Requires="a14">
+        <mc:AlternateContent xmlns:mc="http://schemas.openxmlformats.org/markup-compatibility/2006">
+          <mc:Choice xmlns:a14="http://schemas.microsoft.com/office/drawing/2010/main" Requires="a14">
             <p:sp>
               <p:nvSpPr>
                 <p:cNvPr id="134" name="Text Box 15"/>
@@ -36860,7 +36898,7 @@
               </p:txBody>
             </p:sp>
           </mc:Choice>
-          <mc:Fallback xmlns="">
+          <mc:Fallback>
             <p:sp>
               <p:nvSpPr>
                 <p:cNvPr id="134" name="Text Box 15"/>
@@ -36903,8 +36941,8 @@
             </p:sp>
           </mc:Fallback>
         </mc:AlternateContent>
-        <mc:AlternateContent xmlns:mc="http://schemas.openxmlformats.org/markup-compatibility/2006" xmlns:a14="http://schemas.microsoft.com/office/drawing/2010/main">
-          <mc:Choice Requires="a14">
+        <mc:AlternateContent xmlns:mc="http://schemas.openxmlformats.org/markup-compatibility/2006">
+          <mc:Choice xmlns:a14="http://schemas.microsoft.com/office/drawing/2010/main" Requires="a14">
             <p:sp>
               <p:nvSpPr>
                 <p:cNvPr id="136" name="Text Box 15"/>
@@ -36997,7 +37035,7 @@
               </p:txBody>
             </p:sp>
           </mc:Choice>
-          <mc:Fallback xmlns="">
+          <mc:Fallback>
             <p:sp>
               <p:nvSpPr>
                 <p:cNvPr id="136" name="Text Box 15"/>
@@ -37088,8 +37126,8 @@
             </a:p>
           </p:txBody>
         </p:sp>
-        <mc:AlternateContent xmlns:mc="http://schemas.openxmlformats.org/markup-compatibility/2006" xmlns:a14="http://schemas.microsoft.com/office/drawing/2010/main">
-          <mc:Choice Requires="a14">
+        <mc:AlternateContent xmlns:mc="http://schemas.openxmlformats.org/markup-compatibility/2006">
+          <mc:Choice xmlns:a14="http://schemas.microsoft.com/office/drawing/2010/main" Requires="a14">
             <p:sp>
               <p:nvSpPr>
                 <p:cNvPr id="139" name="TextBox 138"/>
@@ -37133,7 +37171,7 @@
               </p:txBody>
             </p:sp>
           </mc:Choice>
-          <mc:Fallback xmlns="">
+          <mc:Fallback>
             <p:sp>
               <p:nvSpPr>
                 <p:cNvPr id="139" name="TextBox 138"/>
@@ -37172,8 +37210,8 @@
             </p:sp>
           </mc:Fallback>
         </mc:AlternateContent>
-        <mc:AlternateContent xmlns:mc="http://schemas.openxmlformats.org/markup-compatibility/2006" xmlns:a14="http://schemas.microsoft.com/office/drawing/2010/main">
-          <mc:Choice Requires="a14">
+        <mc:AlternateContent xmlns:mc="http://schemas.openxmlformats.org/markup-compatibility/2006">
+          <mc:Choice xmlns:a14="http://schemas.microsoft.com/office/drawing/2010/main" Requires="a14">
             <p:sp>
               <p:nvSpPr>
                 <p:cNvPr id="140" name="TextBox 139"/>
@@ -37223,7 +37261,7 @@
               </p:txBody>
             </p:sp>
           </mc:Choice>
-          <mc:Fallback xmlns="">
+          <mc:Fallback>
             <p:sp>
               <p:nvSpPr>
                 <p:cNvPr id="140" name="TextBox 139"/>
@@ -37367,8 +37405,8 @@
             </a:p>
           </p:txBody>
         </p:sp>
-        <mc:AlternateContent xmlns:mc="http://schemas.openxmlformats.org/markup-compatibility/2006" xmlns:a14="http://schemas.microsoft.com/office/drawing/2010/main">
-          <mc:Choice Requires="a14">
+        <mc:AlternateContent xmlns:mc="http://schemas.openxmlformats.org/markup-compatibility/2006">
+          <mc:Choice xmlns:a14="http://schemas.microsoft.com/office/drawing/2010/main" Requires="a14">
             <p:sp>
               <p:nvSpPr>
                 <p:cNvPr id="143" name="TextBox 142"/>
@@ -37529,7 +37567,7 @@
               </p:txBody>
             </p:sp>
           </mc:Choice>
-          <mc:Fallback xmlns="">
+          <mc:Fallback>
             <p:sp>
               <p:nvSpPr>
                 <p:cNvPr id="143" name="TextBox 142"/>
@@ -37568,8 +37606,8 @@
             </p:sp>
           </mc:Fallback>
         </mc:AlternateContent>
-        <mc:AlternateContent xmlns:mc="http://schemas.openxmlformats.org/markup-compatibility/2006" xmlns:a14="http://schemas.microsoft.com/office/drawing/2010/main">
-          <mc:Choice Requires="a14">
+        <mc:AlternateContent xmlns:mc="http://schemas.openxmlformats.org/markup-compatibility/2006">
+          <mc:Choice xmlns:a14="http://schemas.microsoft.com/office/drawing/2010/main" Requires="a14">
             <p:sp>
               <p:nvSpPr>
                 <p:cNvPr id="144" name="TextBox 143"/>
@@ -37781,7 +37819,7 @@
               </p:txBody>
             </p:sp>
           </mc:Choice>
-          <mc:Fallback xmlns="">
+          <mc:Fallback>
             <p:sp>
               <p:nvSpPr>
                 <p:cNvPr id="144" name="TextBox 143"/>
@@ -37871,8 +37909,8 @@
             </a:p>
           </p:txBody>
         </p:sp>
-        <mc:AlternateContent xmlns:mc="http://schemas.openxmlformats.org/markup-compatibility/2006" xmlns:a14="http://schemas.microsoft.com/office/drawing/2010/main">
-          <mc:Choice Requires="a14">
+        <mc:AlternateContent xmlns:mc="http://schemas.openxmlformats.org/markup-compatibility/2006">
+          <mc:Choice xmlns:a14="http://schemas.microsoft.com/office/drawing/2010/main" Requires="a14">
             <p:sp>
               <p:nvSpPr>
                 <p:cNvPr id="146" name="TextBox 145"/>
@@ -38005,7 +38043,7 @@
               </p:txBody>
             </p:sp>
           </mc:Choice>
-          <mc:Fallback xmlns="">
+          <mc:Fallback>
             <p:sp>
               <p:nvSpPr>
                 <p:cNvPr id="146" name="TextBox 145"/>
@@ -38284,8 +38322,8 @@
             </p:txBody>
           </p:sp>
         </p:grpSp>
-        <mc:AlternateContent xmlns:mc="http://schemas.openxmlformats.org/markup-compatibility/2006" xmlns:a14="http://schemas.microsoft.com/office/drawing/2010/main">
-          <mc:Choice Requires="a14">
+        <mc:AlternateContent xmlns:mc="http://schemas.openxmlformats.org/markup-compatibility/2006">
+          <mc:Choice xmlns:a14="http://schemas.microsoft.com/office/drawing/2010/main" Requires="a14">
             <p:sp>
               <p:nvSpPr>
                 <p:cNvPr id="150" name="TextBox 149"/>
@@ -38342,7 +38380,7 @@
               </p:txBody>
             </p:sp>
           </mc:Choice>
-          <mc:Fallback xmlns="">
+          <mc:Fallback>
             <p:sp>
               <p:nvSpPr>
                 <p:cNvPr id="150" name="TextBox 149"/>
@@ -38481,7 +38519,7 @@
           </p:nvGrpSpPr>
           <p:grpSpPr>
             <a:xfrm>
-              <a:off x="2950690" y="5667546"/>
+              <a:off x="2950690" y="5582884"/>
               <a:ext cx="1684209" cy="115535"/>
               <a:chOff x="2605298" y="1651989"/>
               <a:chExt cx="1684209" cy="115535"/>
@@ -38565,8 +38603,8 @@
             </p:style>
           </p:cxnSp>
         </p:grpSp>
-        <mc:AlternateContent xmlns:mc="http://schemas.openxmlformats.org/markup-compatibility/2006" xmlns:a14="http://schemas.microsoft.com/office/drawing/2010/main">
-          <mc:Choice Requires="a14">
+        <mc:AlternateContent xmlns:mc="http://schemas.openxmlformats.org/markup-compatibility/2006">
+          <mc:Choice xmlns:a14="http://schemas.microsoft.com/office/drawing/2010/main" Requires="a14">
             <p:sp>
               <p:nvSpPr>
                 <p:cNvPr id="153" name="TextBox 152"/>
@@ -38613,7 +38651,7 @@
               </p:txBody>
             </p:sp>
           </mc:Choice>
-          <mc:Fallback xmlns="">
+          <mc:Fallback>
             <p:sp>
               <p:nvSpPr>
                 <p:cNvPr id="153" name="TextBox 152"/>
@@ -38652,8 +38690,8 @@
             </p:sp>
           </mc:Fallback>
         </mc:AlternateContent>
-        <mc:AlternateContent xmlns:mc="http://schemas.openxmlformats.org/markup-compatibility/2006" xmlns:a14="http://schemas.microsoft.com/office/drawing/2010/main">
-          <mc:Choice Requires="a14">
+        <mc:AlternateContent xmlns:mc="http://schemas.openxmlformats.org/markup-compatibility/2006">
+          <mc:Choice xmlns:a14="http://schemas.microsoft.com/office/drawing/2010/main" Requires="a14">
             <p:sp>
               <p:nvSpPr>
                 <p:cNvPr id="154" name="TextBox 153"/>
@@ -38662,7 +38700,7 @@
               </p:nvSpPr>
               <p:spPr>
                 <a:xfrm>
-                  <a:off x="3722656" y="5536124"/>
+                  <a:off x="3722656" y="5451462"/>
                   <a:ext cx="333168" cy="246221"/>
                 </a:xfrm>
                 <a:prstGeom prst="rect">
@@ -38724,7 +38762,7 @@
               </p:txBody>
             </p:sp>
           </mc:Choice>
-          <mc:Fallback xmlns="">
+          <mc:Fallback>
             <p:sp>
               <p:nvSpPr>
                 <p:cNvPr id="154" name="TextBox 153"/>
@@ -38735,7 +38773,7 @@
               </p:nvSpPr>
               <p:spPr>
                 <a:xfrm>
-                  <a:off x="3722656" y="5536124"/>
+                  <a:off x="3722656" y="5451462"/>
                   <a:ext cx="333168" cy="246221"/>
                 </a:xfrm>
                 <a:prstGeom prst="rect">
@@ -39068,8 +39106,8 @@
             </p:txBody>
           </p:sp>
         </p:grpSp>
-        <mc:AlternateContent xmlns:mc="http://schemas.openxmlformats.org/markup-compatibility/2006" xmlns:a14="http://schemas.microsoft.com/office/drawing/2010/main">
-          <mc:Choice Requires="a14">
+        <mc:AlternateContent xmlns:mc="http://schemas.openxmlformats.org/markup-compatibility/2006">
+          <mc:Choice xmlns:a14="http://schemas.microsoft.com/office/drawing/2010/main" Requires="a14">
             <p:sp>
               <p:nvSpPr>
                 <p:cNvPr id="159" name="TextBox 158"/>
@@ -39126,7 +39164,7 @@
               </p:txBody>
             </p:sp>
           </mc:Choice>
-          <mc:Fallback xmlns="">
+          <mc:Fallback>
             <p:sp>
               <p:nvSpPr>
                 <p:cNvPr id="159" name="TextBox 158"/>
@@ -39320,8 +39358,8 @@
             </a:fontRef>
           </p:style>
         </p:cxnSp>
-        <mc:AlternateContent xmlns:mc="http://schemas.openxmlformats.org/markup-compatibility/2006" xmlns:a14="http://schemas.microsoft.com/office/drawing/2010/main">
-          <mc:Choice Requires="a14">
+        <mc:AlternateContent xmlns:mc="http://schemas.openxmlformats.org/markup-compatibility/2006">
+          <mc:Choice xmlns:a14="http://schemas.microsoft.com/office/drawing/2010/main" Requires="a14">
             <p:sp>
               <p:nvSpPr>
                 <p:cNvPr id="200" name="TextBox 199"/>
@@ -39478,7 +39516,7 @@
               </p:txBody>
             </p:sp>
           </mc:Choice>
-          <mc:Fallback xmlns="">
+          <mc:Fallback>
             <p:sp>
               <p:nvSpPr>
                 <p:cNvPr id="200" name="TextBox 199"/>
@@ -39557,8 +39595,8 @@
             </a:fontRef>
           </p:style>
         </p:cxnSp>
-        <mc:AlternateContent xmlns:mc="http://schemas.openxmlformats.org/markup-compatibility/2006" xmlns:a14="http://schemas.microsoft.com/office/drawing/2010/main">
-          <mc:Choice Requires="a14">
+        <mc:AlternateContent xmlns:mc="http://schemas.openxmlformats.org/markup-compatibility/2006">
+          <mc:Choice xmlns:a14="http://schemas.microsoft.com/office/drawing/2010/main" Requires="a14">
             <p:sp>
               <p:nvSpPr>
                 <p:cNvPr id="203" name="TextBox 202"/>
@@ -39649,7 +39687,7 @@
               </p:txBody>
             </p:sp>
           </mc:Choice>
-          <mc:Fallback xmlns="">
+          <mc:Fallback>
             <p:sp>
               <p:nvSpPr>
                 <p:cNvPr id="203" name="TextBox 202"/>
@@ -39718,8 +39756,8 @@
             </a:p>
           </p:txBody>
         </p:sp>
-        <mc:AlternateContent xmlns:mc="http://schemas.openxmlformats.org/markup-compatibility/2006" xmlns:a14="http://schemas.microsoft.com/office/drawing/2010/main">
-          <mc:Choice Requires="a14">
+        <mc:AlternateContent xmlns:mc="http://schemas.openxmlformats.org/markup-compatibility/2006">
+          <mc:Choice xmlns:a14="http://schemas.microsoft.com/office/drawing/2010/main" Requires="a14">
             <p:sp>
               <p:nvSpPr>
                 <p:cNvPr id="205" name="TextBox 204"/>
@@ -39786,7 +39824,7 @@
               </p:txBody>
             </p:sp>
           </mc:Choice>
-          <mc:Fallback xmlns="">
+          <mc:Fallback>
             <p:sp>
               <p:nvSpPr>
                 <p:cNvPr id="205" name="TextBox 204"/>
@@ -39980,8 +40018,8 @@
             </a:p>
           </p:txBody>
         </p:sp>
-        <mc:AlternateContent xmlns:mc="http://schemas.openxmlformats.org/markup-compatibility/2006" xmlns:a14="http://schemas.microsoft.com/office/drawing/2010/main">
-          <mc:Choice Requires="a14">
+        <mc:AlternateContent xmlns:mc="http://schemas.openxmlformats.org/markup-compatibility/2006">
+          <mc:Choice xmlns:a14="http://schemas.microsoft.com/office/drawing/2010/main" Requires="a14">
             <p:sp>
               <p:nvSpPr>
                 <p:cNvPr id="210" name="TextBox 209"/>
@@ -40072,7 +40110,7 @@
               </p:txBody>
             </p:sp>
           </mc:Choice>
-          <mc:Fallback xmlns="">
+          <mc:Fallback>
             <p:sp>
               <p:nvSpPr>
                 <p:cNvPr id="210" name="TextBox 209"/>
@@ -40111,8 +40149,8 @@
             </p:sp>
           </mc:Fallback>
         </mc:AlternateContent>
-        <mc:AlternateContent xmlns:mc="http://schemas.openxmlformats.org/markup-compatibility/2006" xmlns:a14="http://schemas.microsoft.com/office/drawing/2010/main">
-          <mc:Choice Requires="a14">
+        <mc:AlternateContent xmlns:mc="http://schemas.openxmlformats.org/markup-compatibility/2006">
+          <mc:Choice xmlns:a14="http://schemas.microsoft.com/office/drawing/2010/main" Requires="a14">
             <p:sp>
               <p:nvSpPr>
                 <p:cNvPr id="211" name="TextBox 210"/>
@@ -40203,7 +40241,7 @@
               </p:txBody>
             </p:sp>
           </mc:Choice>
-          <mc:Fallback xmlns="">
+          <mc:Fallback>
             <p:sp>
               <p:nvSpPr>
                 <p:cNvPr id="211" name="TextBox 210"/>
@@ -40385,8 +40423,8 @@
             </p:style>
           </p:cxnSp>
         </p:grpSp>
-        <mc:AlternateContent xmlns:mc="http://schemas.openxmlformats.org/markup-compatibility/2006" xmlns:a14="http://schemas.microsoft.com/office/drawing/2010/main">
-          <mc:Choice Requires="a14">
+        <mc:AlternateContent xmlns:mc="http://schemas.openxmlformats.org/markup-compatibility/2006">
+          <mc:Choice xmlns:a14="http://schemas.microsoft.com/office/drawing/2010/main" Requires="a14">
             <p:sp>
               <p:nvSpPr>
                 <p:cNvPr id="220" name="TextBox 219"/>
@@ -40452,7 +40490,7 @@
               </p:txBody>
             </p:sp>
           </mc:Choice>
-          <mc:Fallback xmlns="">
+          <mc:Fallback>
             <p:sp>
               <p:nvSpPr>
                 <p:cNvPr id="220" name="TextBox 219"/>
@@ -40491,8 +40529,8 @@
             </p:sp>
           </mc:Fallback>
         </mc:AlternateContent>
-        <mc:AlternateContent xmlns:mc="http://schemas.openxmlformats.org/markup-compatibility/2006" xmlns:a14="http://schemas.microsoft.com/office/drawing/2010/main">
-          <mc:Choice Requires="a14">
+        <mc:AlternateContent xmlns:mc="http://schemas.openxmlformats.org/markup-compatibility/2006">
+          <mc:Choice xmlns:a14="http://schemas.microsoft.com/office/drawing/2010/main" Requires="a14">
             <p:sp>
               <p:nvSpPr>
                 <p:cNvPr id="221" name="TextBox 220"/>
@@ -40566,7 +40604,7 @@
               </p:txBody>
             </p:sp>
           </mc:Choice>
-          <mc:Fallback xmlns="">
+          <mc:Fallback>
             <p:sp>
               <p:nvSpPr>
                 <p:cNvPr id="221" name="TextBox 220"/>
@@ -40585,6 +40623,201 @@
                 </a:prstGeom>
                 <a:blipFill rotWithShape="0">
                   <a:blip r:embed="rId44"/>
+                  <a:stretch>
+                    <a:fillRect/>
+                  </a:stretch>
+                </a:blipFill>
+              </p:spPr>
+              <p:txBody>
+                <a:bodyPr/>
+                <a:lstStyle/>
+                <a:p>
+                  <a:r>
+                    <a:rPr lang="en-US">
+                      <a:noFill/>
+                    </a:rPr>
+                    <a:t> </a:t>
+                  </a:r>
+                </a:p>
+              </p:txBody>
+            </p:sp>
+          </mc:Fallback>
+        </mc:AlternateContent>
+        <p:grpSp>
+          <p:nvGrpSpPr>
+            <p:cNvPr id="168" name="Group 167"/>
+            <p:cNvGrpSpPr/>
+            <p:nvPr/>
+          </p:nvGrpSpPr>
+          <p:grpSpPr>
+            <a:xfrm>
+              <a:off x="2950685" y="5760682"/>
+              <a:ext cx="1775649" cy="115535"/>
+              <a:chOff x="2605298" y="1651989"/>
+              <a:chExt cx="1775649" cy="115535"/>
+            </a:xfrm>
+          </p:grpSpPr>
+          <p:cxnSp>
+            <p:nvCxnSpPr>
+              <p:cNvPr id="169" name="Straight Connector 168"/>
+              <p:cNvCxnSpPr>
+                <a:cxnSpLocks/>
+              </p:cNvCxnSpPr>
+              <p:nvPr/>
+            </p:nvCxnSpPr>
+            <p:spPr>
+              <a:xfrm flipH="1">
+                <a:off x="2605298" y="1651989"/>
+                <a:ext cx="0" cy="115535"/>
+              </a:xfrm>
+              <a:prstGeom prst="line">
+                <a:avLst/>
+              </a:prstGeom>
+              <a:ln w="6350">
+                <a:solidFill>
+                  <a:schemeClr val="tx1">
+                    <a:lumMod val="85000"/>
+                    <a:lumOff val="15000"/>
+                  </a:schemeClr>
+                </a:solidFill>
+                <a:prstDash val="solid"/>
+                <a:headEnd type="none" w="med" len="med"/>
+                <a:tailEnd type="none" w="med" len="med"/>
+              </a:ln>
+            </p:spPr>
+            <p:style>
+              <a:lnRef idx="1">
+                <a:schemeClr val="accent1"/>
+              </a:lnRef>
+              <a:fillRef idx="0">
+                <a:schemeClr val="accent1"/>
+              </a:fillRef>
+              <a:effectRef idx="0">
+                <a:schemeClr val="accent1"/>
+              </a:effectRef>
+              <a:fontRef idx="minor">
+                <a:schemeClr val="tx1"/>
+              </a:fontRef>
+            </p:style>
+          </p:cxnSp>
+          <p:cxnSp>
+            <p:nvCxnSpPr>
+              <p:cNvPr id="170" name="Straight Arrow Connector 169"/>
+              <p:cNvCxnSpPr/>
+              <p:nvPr/>
+            </p:nvCxnSpPr>
+            <p:spPr>
+              <a:xfrm flipV="1">
+                <a:off x="2607011" y="1709756"/>
+                <a:ext cx="1773936" cy="0"/>
+              </a:xfrm>
+              <a:prstGeom prst="straightConnector1">
+                <a:avLst/>
+              </a:prstGeom>
+              <a:ln>
+                <a:headEnd type="none" w="med" len="med"/>
+                <a:tailEnd type="arrow" w="sm" len="sm"/>
+              </a:ln>
+            </p:spPr>
+            <p:style>
+              <a:lnRef idx="1">
+                <a:schemeClr val="dk1"/>
+              </a:lnRef>
+              <a:fillRef idx="0">
+                <a:schemeClr val="dk1"/>
+              </a:fillRef>
+              <a:effectRef idx="0">
+                <a:schemeClr val="dk1"/>
+              </a:effectRef>
+              <a:fontRef idx="minor">
+                <a:schemeClr val="tx1"/>
+              </a:fontRef>
+            </p:style>
+          </p:cxnSp>
+        </p:grpSp>
+        <mc:AlternateContent xmlns:mc="http://schemas.openxmlformats.org/markup-compatibility/2006">
+          <mc:Choice xmlns:a14="http://schemas.microsoft.com/office/drawing/2010/main" Requires="a14">
+            <p:sp>
+              <p:nvSpPr>
+                <p:cNvPr id="172" name="TextBox 171"/>
+                <p:cNvSpPr txBox="1"/>
+                <p:nvPr/>
+              </p:nvSpPr>
+              <p:spPr>
+                <a:xfrm>
+                  <a:off x="3718418" y="5616561"/>
+                  <a:ext cx="346953" cy="246221"/>
+                </a:xfrm>
+                <a:prstGeom prst="rect">
+                  <a:avLst/>
+                </a:prstGeom>
+                <a:noFill/>
+              </p:spPr>
+              <p:txBody>
+                <a:bodyPr wrap="none" rtlCol="0">
+                  <a:spAutoFit/>
+                </a:bodyPr>
+                <a:lstStyle/>
+                <a:p>
+                  <a:pPr/>
+                  <a14:m>
+                    <m:oMathPara xmlns:m="http://schemas.openxmlformats.org/officeDocument/2006/math">
+                      <m:oMathParaPr>
+                        <m:jc m:val="centerGroup"/>
+                      </m:oMathParaPr>
+                      <m:oMath xmlns:m="http://schemas.openxmlformats.org/officeDocument/2006/math">
+                        <m:sSub>
+                          <m:sSubPr>
+                            <m:ctrlPr>
+                              <a:rPr lang="en-US" sz="1000" b="0" i="1" smtClean="0">
+                                <a:latin typeface="Cambria Math" panose="02040503050406030204" pitchFamily="18" charset="0"/>
+                              </a:rPr>
+                            </m:ctrlPr>
+                          </m:sSubPr>
+                          <m:e>
+                            <m:r>
+                              <a:rPr lang="en-US" sz="1000" b="0" i="1" smtClean="0">
+                                <a:latin typeface="Cambria Math" panose="02040503050406030204" pitchFamily="18" charset="0"/>
+                              </a:rPr>
+                              <m:t>𝑍</m:t>
+                            </m:r>
+                          </m:e>
+                          <m:sub>
+                            <m:r>
+                              <a:rPr lang="en-US" sz="1000" b="0" i="1" smtClean="0">
+                                <a:latin typeface="Cambria Math" panose="02040503050406030204" pitchFamily="18" charset="0"/>
+                              </a:rPr>
+                              <m:t>𝑜</m:t>
+                            </m:r>
+                          </m:sub>
+                        </m:sSub>
+                      </m:oMath>
+                    </m:oMathPara>
+                  </a14:m>
+                  <a:endParaRPr lang="en-US" sz="1000" dirty="0"/>
+                </a:p>
+              </p:txBody>
+            </p:sp>
+          </mc:Choice>
+          <mc:Fallback>
+            <p:sp>
+              <p:nvSpPr>
+                <p:cNvPr id="172" name="TextBox 171"/>
+                <p:cNvSpPr txBox="1">
+                  <a:spLocks noRot="1" noChangeAspect="1" noMove="1" noResize="1" noEditPoints="1" noAdjustHandles="1" noChangeArrowheads="1" noChangeShapeType="1" noTextEdit="1"/>
+                </p:cNvSpPr>
+                <p:nvPr/>
+              </p:nvSpPr>
+              <p:spPr>
+                <a:xfrm>
+                  <a:off x="3718418" y="5616561"/>
+                  <a:ext cx="346953" cy="246221"/>
+                </a:xfrm>
+                <a:prstGeom prst="rect">
+                  <a:avLst/>
+                </a:prstGeom>
+                <a:blipFill rotWithShape="0">
+                  <a:blip r:embed="rId45"/>
                   <a:stretch>
                     <a:fillRect/>
                   </a:stretch>
@@ -41445,8 +41678,8 @@
             </p:style>
           </p:cxnSp>
         </p:grpSp>
-        <mc:AlternateContent xmlns:mc="http://schemas.openxmlformats.org/markup-compatibility/2006" xmlns:a14="http://schemas.microsoft.com/office/drawing/2010/main">
-          <mc:Choice Requires="a14">
+        <mc:AlternateContent xmlns:mc="http://schemas.openxmlformats.org/markup-compatibility/2006">
+          <mc:Choice xmlns:a14="http://schemas.microsoft.com/office/drawing/2010/main" Requires="a14">
             <p:sp>
               <p:nvSpPr>
                 <p:cNvPr id="80" name="TextBox 79"/>
@@ -41456,7 +41689,7 @@
               <p:spPr>
                 <a:xfrm>
                   <a:off x="3576508" y="2341013"/>
-                  <a:ext cx="333168" cy="246221"/>
+                  <a:ext cx="346953" cy="246221"/>
                 </a:xfrm>
                 <a:prstGeom prst="rect">
                   <a:avLst/>
@@ -41476,14 +41709,14 @@
                         <m:jc m:val="centerGroup"/>
                       </m:oMathParaPr>
                       <m:oMath xmlns:m="http://schemas.openxmlformats.org/officeDocument/2006/math">
-                        <m:sSubSup>
-                          <m:sSubSupPr>
+                        <m:sSub>
+                          <m:sSubPr>
                             <m:ctrlPr>
                               <a:rPr lang="en-US" sz="1000" b="0" i="1" smtClean="0">
                                 <a:latin typeface="Cambria Math" panose="02040503050406030204" pitchFamily="18" charset="0"/>
                               </a:rPr>
                             </m:ctrlPr>
-                          </m:sSubSupPr>
+                          </m:sSubPr>
                           <m:e>
                             <m:r>
                               <a:rPr lang="en-US" sz="1000" b="0" i="1" smtClean="0">
@@ -41497,18 +41730,10 @@
                               <a:rPr lang="en-US" sz="1000" b="0" i="1" smtClean="0">
                                 <a:latin typeface="Cambria Math" panose="02040503050406030204" pitchFamily="18" charset="0"/>
                               </a:rPr>
-                              <m:t> </m:t>
+                              <m:t>𝑜</m:t>
                             </m:r>
                           </m:sub>
-                          <m:sup>
-                            <m:r>
-                              <a:rPr lang="en-US" sz="1000" b="0" i="1" smtClean="0">
-                                <a:latin typeface="Cambria Math" panose="02040503050406030204" pitchFamily="18" charset="0"/>
-                              </a:rPr>
-                              <m:t>′</m:t>
-                            </m:r>
-                          </m:sup>
-                        </m:sSubSup>
+                        </m:sSub>
                       </m:oMath>
                     </m:oMathPara>
                   </a14:m>
@@ -41517,7 +41742,7 @@
               </p:txBody>
             </p:sp>
           </mc:Choice>
-          <mc:Fallback xmlns="">
+          <mc:Fallback>
             <p:sp>
               <p:nvSpPr>
                 <p:cNvPr id="80" name="TextBox 79"/>
@@ -41529,7 +41754,7 @@
               <p:spPr>
                 <a:xfrm>
                   <a:off x="3576508" y="2341013"/>
-                  <a:ext cx="333168" cy="246221"/>
+                  <a:ext cx="346953" cy="246221"/>
                 </a:xfrm>
                 <a:prstGeom prst="rect">
                   <a:avLst/>
@@ -41922,8 +42147,8 @@
             </a:fontRef>
           </p:style>
         </p:cxnSp>
-        <mc:AlternateContent xmlns:mc="http://schemas.openxmlformats.org/markup-compatibility/2006" xmlns:a14="http://schemas.microsoft.com/office/drawing/2010/main">
-          <mc:Choice Requires="a14">
+        <mc:AlternateContent xmlns:mc="http://schemas.openxmlformats.org/markup-compatibility/2006">
+          <mc:Choice xmlns:a14="http://schemas.microsoft.com/office/drawing/2010/main" Requires="a14">
             <p:sp>
               <p:nvSpPr>
                 <p:cNvPr id="104" name="TextBox 103"/>
@@ -41932,8 +42157,8 @@
               </p:nvSpPr>
               <p:spPr>
                 <a:xfrm rot="691448">
-                  <a:off x="3573412" y="2890729"/>
-                  <a:ext cx="356123" cy="246221"/>
+                  <a:off x="3545135" y="2890729"/>
+                  <a:ext cx="412677" cy="246221"/>
                 </a:xfrm>
                 <a:prstGeom prst="rect">
                   <a:avLst/>
@@ -41953,14 +42178,14 @@
                         <m:jc m:val="centerGroup"/>
                       </m:oMathParaPr>
                       <m:oMath xmlns:m="http://schemas.openxmlformats.org/officeDocument/2006/math">
-                        <m:sSubSup>
-                          <m:sSubSupPr>
+                        <m:sSub>
+                          <m:sSubPr>
                             <m:ctrlPr>
                               <a:rPr lang="en-US" sz="1000" b="0" i="1" smtClean="0">
                                 <a:latin typeface="Cambria Math" panose="02040503050406030204" pitchFamily="18" charset="0"/>
                               </a:rPr>
                             </m:ctrlPr>
-                          </m:sSubSupPr>
+                          </m:sSubPr>
                           <m:e>
                             <m:r>
                               <a:rPr lang="en-US" sz="1000" b="0" i="1" smtClean="0">
@@ -41973,20 +42198,18 @@
                             <m:r>
                               <a:rPr lang="en-US" sz="1000" b="0" i="1" smtClean="0">
                                 <a:latin typeface="Cambria Math" panose="02040503050406030204" pitchFamily="18" charset="0"/>
+                              </a:rPr>
+                              <m:t>𝑜</m:t>
+                            </m:r>
+                            <m:r>
+                              <a:rPr lang="en-US" sz="1000" i="1">
+                                <a:latin typeface="Cambria Math" panose="02040503050406030204" pitchFamily="18" charset="0"/>
                                 <a:ea typeface="Cambria Math" panose="02040503050406030204" pitchFamily="18" charset="0"/>
                               </a:rPr>
                               <m:t>⊥</m:t>
                             </m:r>
                           </m:sub>
-                          <m:sup>
-                            <m:r>
-                              <a:rPr lang="en-US" sz="1000" b="0" i="1" smtClean="0">
-                                <a:latin typeface="Cambria Math" panose="02040503050406030204" pitchFamily="18" charset="0"/>
-                              </a:rPr>
-                              <m:t>′</m:t>
-                            </m:r>
-                          </m:sup>
-                        </m:sSubSup>
+                        </m:sSub>
                       </m:oMath>
                     </m:oMathPara>
                   </a14:m>
@@ -41995,7 +42218,7 @@
               </p:txBody>
             </p:sp>
           </mc:Choice>
-          <mc:Fallback xmlns="">
+          <mc:Fallback>
             <p:sp>
               <p:nvSpPr>
                 <p:cNvPr id="104" name="TextBox 103"/>
@@ -42006,8 +42229,8 @@
               </p:nvSpPr>
               <p:spPr>
                 <a:xfrm rot="691448">
-                  <a:off x="3573412" y="2890729"/>
-                  <a:ext cx="356123" cy="246221"/>
+                  <a:off x="3545135" y="2890729"/>
+                  <a:ext cx="412677" cy="246221"/>
                 </a:xfrm>
                 <a:prstGeom prst="rect">
                   <a:avLst/>
@@ -42034,8 +42257,8 @@
             </p:sp>
           </mc:Fallback>
         </mc:AlternateContent>
-        <mc:AlternateContent xmlns:mc="http://schemas.openxmlformats.org/markup-compatibility/2006" xmlns:a14="http://schemas.microsoft.com/office/drawing/2010/main">
-          <mc:Choice Requires="a14">
+        <mc:AlternateContent xmlns:mc="http://schemas.openxmlformats.org/markup-compatibility/2006">
+          <mc:Choice xmlns:a14="http://schemas.microsoft.com/office/drawing/2010/main" Requires="a14">
             <p:sp>
               <p:nvSpPr>
                 <p:cNvPr id="105" name="TextBox 104"/>
@@ -42080,18 +42303,31 @@
                               </a:rPr>
                               <m:t>0, 0, </m:t>
                             </m:r>
-                            <m:r>
-                              <a:rPr lang="en-US" sz="1000" b="0" i="1" smtClean="0">
-                                <a:latin typeface="Cambria Math" panose="02040503050406030204" pitchFamily="18" charset="0"/>
-                              </a:rPr>
-                              <m:t>𝑍</m:t>
-                            </m:r>
-                            <m:r>
-                              <a:rPr lang="en-US" sz="1000" b="0" i="1" smtClean="0">
-                                <a:latin typeface="Cambria Math" panose="02040503050406030204" pitchFamily="18" charset="0"/>
-                              </a:rPr>
-                              <m:t>′</m:t>
-                            </m:r>
+                            <m:sSub>
+                              <m:sSubPr>
+                                <m:ctrlPr>
+                                  <a:rPr lang="en-US" sz="1000" b="0" i="1" smtClean="0">
+                                    <a:latin typeface="Cambria Math" panose="02040503050406030204" pitchFamily="18" charset="0"/>
+                                  </a:rPr>
+                                </m:ctrlPr>
+                              </m:sSubPr>
+                              <m:e>
+                                <m:r>
+                                  <a:rPr lang="en-US" sz="1000" b="0" i="1" smtClean="0">
+                                    <a:latin typeface="Cambria Math" panose="02040503050406030204" pitchFamily="18" charset="0"/>
+                                  </a:rPr>
+                                  <m:t>𝑍</m:t>
+                                </m:r>
+                              </m:e>
+                              <m:sub>
+                                <m:r>
+                                  <a:rPr lang="en-US" sz="1000" b="0" i="1" smtClean="0">
+                                    <a:latin typeface="Cambria Math" panose="02040503050406030204" pitchFamily="18" charset="0"/>
+                                  </a:rPr>
+                                  <m:t>𝑜</m:t>
+                                </m:r>
+                              </m:sub>
+                            </m:sSub>
                           </m:e>
                         </m:d>
                       </m:oMath>
@@ -42102,7 +42338,7 @@
               </p:txBody>
             </p:sp>
           </mc:Choice>
-          <mc:Fallback xmlns="">
+          <mc:Fallback>
             <p:sp>
               <p:nvSpPr>
                 <p:cNvPr id="105" name="TextBox 104"/>

</xml_diff>

<commit_message>
updated notations and figures using the new notation
</commit_message>
<xml_diff>
--- a/chapters/chapter03_geometricmodel/figures/figures_PPT.pptx
+++ b/chapters/chapter03_geometricmodel/figures/figures_PPT.pptx
@@ -247,7 +247,7 @@
           <a:p>
             <a:fld id="{D25EE769-EC14-4089-BCC7-B0C4A40ED0F9}" type="datetimeFigureOut">
               <a:rPr lang="en-US" smtClean="0"/>
-              <a:t>9/17/2015</a:t>
+              <a:t>9/19/2015</a:t>
             </a:fld>
             <a:endParaRPr lang="en-US"/>
           </a:p>
@@ -417,7 +417,7 @@
           <a:p>
             <a:fld id="{D25EE769-EC14-4089-BCC7-B0C4A40ED0F9}" type="datetimeFigureOut">
               <a:rPr lang="en-US" smtClean="0"/>
-              <a:t>9/17/2015</a:t>
+              <a:t>9/19/2015</a:t>
             </a:fld>
             <a:endParaRPr lang="en-US"/>
           </a:p>
@@ -597,7 +597,7 @@
           <a:p>
             <a:fld id="{D25EE769-EC14-4089-BCC7-B0C4A40ED0F9}" type="datetimeFigureOut">
               <a:rPr lang="en-US" smtClean="0"/>
-              <a:t>9/17/2015</a:t>
+              <a:t>9/19/2015</a:t>
             </a:fld>
             <a:endParaRPr lang="en-US"/>
           </a:p>
@@ -767,7 +767,7 @@
           <a:p>
             <a:fld id="{D25EE769-EC14-4089-BCC7-B0C4A40ED0F9}" type="datetimeFigureOut">
               <a:rPr lang="en-US" smtClean="0"/>
-              <a:t>9/17/2015</a:t>
+              <a:t>9/19/2015</a:t>
             </a:fld>
             <a:endParaRPr lang="en-US"/>
           </a:p>
@@ -1011,7 +1011,7 @@
           <a:p>
             <a:fld id="{D25EE769-EC14-4089-BCC7-B0C4A40ED0F9}" type="datetimeFigureOut">
               <a:rPr lang="en-US" smtClean="0"/>
-              <a:t>9/17/2015</a:t>
+              <a:t>9/19/2015</a:t>
             </a:fld>
             <a:endParaRPr lang="en-US"/>
           </a:p>
@@ -1243,7 +1243,7 @@
           <a:p>
             <a:fld id="{D25EE769-EC14-4089-BCC7-B0C4A40ED0F9}" type="datetimeFigureOut">
               <a:rPr lang="en-US" smtClean="0"/>
-              <a:t>9/17/2015</a:t>
+              <a:t>9/19/2015</a:t>
             </a:fld>
             <a:endParaRPr lang="en-US"/>
           </a:p>
@@ -1610,7 +1610,7 @@
           <a:p>
             <a:fld id="{D25EE769-EC14-4089-BCC7-B0C4A40ED0F9}" type="datetimeFigureOut">
               <a:rPr lang="en-US" smtClean="0"/>
-              <a:t>9/17/2015</a:t>
+              <a:t>9/19/2015</a:t>
             </a:fld>
             <a:endParaRPr lang="en-US"/>
           </a:p>
@@ -1728,7 +1728,7 @@
           <a:p>
             <a:fld id="{D25EE769-EC14-4089-BCC7-B0C4A40ED0F9}" type="datetimeFigureOut">
               <a:rPr lang="en-US" smtClean="0"/>
-              <a:t>9/17/2015</a:t>
+              <a:t>9/19/2015</a:t>
             </a:fld>
             <a:endParaRPr lang="en-US"/>
           </a:p>
@@ -1823,7 +1823,7 @@
           <a:p>
             <a:fld id="{D25EE769-EC14-4089-BCC7-B0C4A40ED0F9}" type="datetimeFigureOut">
               <a:rPr lang="en-US" smtClean="0"/>
-              <a:t>9/17/2015</a:t>
+              <a:t>9/19/2015</a:t>
             </a:fld>
             <a:endParaRPr lang="en-US"/>
           </a:p>
@@ -2100,7 +2100,7 @@
           <a:p>
             <a:fld id="{D25EE769-EC14-4089-BCC7-B0C4A40ED0F9}" type="datetimeFigureOut">
               <a:rPr lang="en-US" smtClean="0"/>
-              <a:t>9/17/2015</a:t>
+              <a:t>9/19/2015</a:t>
             </a:fld>
             <a:endParaRPr lang="en-US"/>
           </a:p>
@@ -2357,7 +2357,7 @@
           <a:p>
             <a:fld id="{D25EE769-EC14-4089-BCC7-B0C4A40ED0F9}" type="datetimeFigureOut">
               <a:rPr lang="en-US" smtClean="0"/>
-              <a:t>9/17/2015</a:t>
+              <a:t>9/19/2015</a:t>
             </a:fld>
             <a:endParaRPr lang="en-US"/>
           </a:p>
@@ -2570,7 +2570,7 @@
           <a:p>
             <a:fld id="{D25EE769-EC14-4089-BCC7-B0C4A40ED0F9}" type="datetimeFigureOut">
               <a:rPr lang="en-US" smtClean="0"/>
-              <a:t>9/17/2015</a:t>
+              <a:t>9/19/2015</a:t>
             </a:fld>
             <a:endParaRPr lang="en-US"/>
           </a:p>
@@ -3774,18 +3774,24 @@
                         <m:jc m:val="centerGroup"/>
                       </m:oMathParaPr>
                       <m:oMath xmlns:m="http://schemas.openxmlformats.org/officeDocument/2006/math">
-                        <m:r>
-                          <a:rPr lang="en-US" sz="1100" b="0" i="1" smtClean="0">
-                            <a:latin typeface="Cambria Math" panose="02040503050406030204" pitchFamily="18" charset="0"/>
-                          </a:rPr>
-                          <m:t>𝜔</m:t>
-                        </m:r>
-                        <m:r>
-                          <a:rPr lang="en-US" sz="1100" b="0" i="1" smtClean="0">
-                            <a:latin typeface="Cambria Math" panose="02040503050406030204" pitchFamily="18" charset="0"/>
-                          </a:rPr>
-                          <m:t>′</m:t>
-                        </m:r>
+                        <m:acc>
+                          <m:accPr>
+                            <m:chr m:val="́"/>
+                            <m:ctrlPr>
+                              <a:rPr lang="en-US" sz="1100" b="0" i="1" smtClean="0">
+                                <a:latin typeface="Cambria Math" panose="02040503050406030204" pitchFamily="18" charset="0"/>
+                              </a:rPr>
+                            </m:ctrlPr>
+                          </m:accPr>
+                          <m:e>
+                            <m:r>
+                              <a:rPr lang="en-US" sz="1100" b="0" i="1" smtClean="0">
+                                <a:latin typeface="Cambria Math" panose="02040503050406030204" pitchFamily="18" charset="0"/>
+                              </a:rPr>
+                              <m:t>𝜔</m:t>
+                            </m:r>
+                          </m:e>
+                        </m:acc>
                       </m:oMath>
                     </m:oMathPara>
                   </a14:m>
@@ -3814,7 +3820,7 @@
                 <a:blipFill rotWithShape="0">
                   <a:blip r:embed="rId6"/>
                   <a:stretch>
-                    <a:fillRect r="-4444"/>
+                    <a:fillRect r="-13333"/>
                   </a:stretch>
                 </a:blipFill>
               </p:spPr>
@@ -4487,7 +4493,7 @@
                               <a:rPr lang="en-US" sz="1000" b="0" i="1" smtClean="0">
                                 <a:latin typeface="Cambria Math" panose="02040503050406030204" pitchFamily="18" charset="0"/>
                               </a:rPr>
-                              <m:t>𝑍</m:t>
+                              <m:t>𝑧</m:t>
                             </m:r>
                           </m:e>
                           <m:sub>
@@ -4560,7 +4566,7 @@
               <p:spPr>
                 <a:xfrm>
                   <a:off x="3822562" y="4108974"/>
-                  <a:ext cx="344518" cy="246221"/>
+                  <a:ext cx="332335" cy="246221"/>
                 </a:xfrm>
                 <a:prstGeom prst="rect">
                   <a:avLst/>
@@ -4589,12 +4595,24 @@
                             </m:ctrlPr>
                           </m:sSubSupPr>
                           <m:e>
-                            <m:r>
-                              <a:rPr lang="en-US" sz="1000" b="0" i="1" smtClean="0">
-                                <a:latin typeface="Cambria Math" panose="02040503050406030204" pitchFamily="18" charset="0"/>
-                              </a:rPr>
-                              <m:t>𝑍</m:t>
-                            </m:r>
+                            <m:acc>
+                              <m:accPr>
+                                <m:chr m:val="́"/>
+                                <m:ctrlPr>
+                                  <a:rPr lang="en-US" sz="1000" b="0" i="1" smtClean="0">
+                                    <a:latin typeface="Cambria Math" panose="02040503050406030204" pitchFamily="18" charset="0"/>
+                                  </a:rPr>
+                                </m:ctrlPr>
+                              </m:accPr>
+                              <m:e>
+                                <m:r>
+                                  <a:rPr lang="en-US" sz="1000" b="0" i="1" smtClean="0">
+                                    <a:latin typeface="Cambria Math" panose="02040503050406030204" pitchFamily="18" charset="0"/>
+                                  </a:rPr>
+                                  <m:t>𝑧</m:t>
+                                </m:r>
+                              </m:e>
+                            </m:acc>
                           </m:e>
                           <m:sub>
                             <m:r>
@@ -4609,7 +4627,7 @@
                               <a:rPr lang="en-US" sz="1000" b="0" i="1" smtClean="0">
                                 <a:latin typeface="Cambria Math" panose="02040503050406030204" pitchFamily="18" charset="0"/>
                               </a:rPr>
-                              <m:t>′</m:t>
+                              <m:t> </m:t>
                             </m:r>
                           </m:sup>
                         </m:sSubSup>
@@ -4633,7 +4651,7 @@
               <p:spPr>
                 <a:xfrm>
                   <a:off x="3822562" y="4108974"/>
-                  <a:ext cx="344518" cy="246221"/>
+                  <a:ext cx="332335" cy="246221"/>
                 </a:xfrm>
                 <a:prstGeom prst="rect">
                   <a:avLst/>
@@ -4641,7 +4659,7 @@
                 <a:blipFill rotWithShape="0">
                   <a:blip r:embed="rId8"/>
                   <a:stretch>
-                    <a:fillRect/>
+                    <a:fillRect r="-3636"/>
                   </a:stretch>
                 </a:blipFill>
               </p:spPr>
@@ -5698,15 +5716,30 @@
                             </m:ctrlPr>
                           </m:sSupPr>
                           <m:e>
-                            <m:r>
-                              <a:rPr lang="en-US" sz="900" b="0" i="1" dirty="0" smtClean="0">
-                                <a:effectLst/>
-                                <a:latin typeface="Cambria Math" panose="02040503050406030204" pitchFamily="18" charset="0"/>
-                                <a:ea typeface="Calibri"/>
-                                <a:cs typeface="Times New Roman"/>
-                              </a:rPr>
-                              <m:t>𝑦</m:t>
-                            </m:r>
+                            <m:acc>
+                              <m:accPr>
+                                <m:chr m:val="́"/>
+                                <m:ctrlPr>
+                                  <a:rPr lang="en-US" sz="900" b="0" i="1" dirty="0" smtClean="0">
+                                    <a:effectLst/>
+                                    <a:latin typeface="Cambria Math" panose="02040503050406030204" pitchFamily="18" charset="0"/>
+                                    <a:ea typeface="Calibri"/>
+                                    <a:cs typeface="Times New Roman"/>
+                                  </a:rPr>
+                                </m:ctrlPr>
+                              </m:accPr>
+                              <m:e>
+                                <m:r>
+                                  <a:rPr lang="en-US" sz="900" b="0" i="1" dirty="0" smtClean="0">
+                                    <a:effectLst/>
+                                    <a:latin typeface="Cambria Math" panose="02040503050406030204" pitchFamily="18" charset="0"/>
+                                    <a:ea typeface="Calibri"/>
+                                    <a:cs typeface="Times New Roman"/>
+                                  </a:rPr>
+                                  <m:t>𝑦</m:t>
+                                </m:r>
+                              </m:e>
+                            </m:acc>
                           </m:e>
                           <m:sup>
                             <m:r>
@@ -5716,7 +5749,7 @@
                                 <a:ea typeface="Calibri"/>
                                 <a:cs typeface="Times New Roman"/>
                               </a:rPr>
-                              <m:t>′</m:t>
+                              <m:t> </m:t>
                             </m:r>
                           </m:sup>
                         </m:sSup>
@@ -5806,18 +5839,24 @@
                         <m:jc m:val="centerGroup"/>
                       </m:oMathParaPr>
                       <m:oMath xmlns:m="http://schemas.openxmlformats.org/officeDocument/2006/math">
-                        <m:r>
-                          <a:rPr lang="en-US" sz="1100" b="0" i="1" smtClean="0">
-                            <a:latin typeface="Cambria Math" panose="02040503050406030204" pitchFamily="18" charset="0"/>
-                          </a:rPr>
-                          <m:t>𝑢</m:t>
-                        </m:r>
-                        <m:r>
-                          <a:rPr lang="en-US" sz="1100" b="0" i="1" smtClean="0">
-                            <a:latin typeface="Cambria Math" panose="02040503050406030204" pitchFamily="18" charset="0"/>
-                          </a:rPr>
-                          <m:t>′</m:t>
-                        </m:r>
+                        <m:acc>
+                          <m:accPr>
+                            <m:chr m:val="́"/>
+                            <m:ctrlPr>
+                              <a:rPr lang="en-US" sz="1100" b="0" i="1" smtClean="0">
+                                <a:latin typeface="Cambria Math" panose="02040503050406030204" pitchFamily="18" charset="0"/>
+                              </a:rPr>
+                            </m:ctrlPr>
+                          </m:accPr>
+                          <m:e>
+                            <m:r>
+                              <a:rPr lang="en-US" sz="1100" b="0" i="1" smtClean="0">
+                                <a:latin typeface="Cambria Math" panose="02040503050406030204" pitchFamily="18" charset="0"/>
+                              </a:rPr>
+                              <m:t>𝑢</m:t>
+                            </m:r>
+                          </m:e>
+                        </m:acc>
                       </m:oMath>
                     </m:oMathPara>
                   </a14:m>
@@ -5846,7 +5885,7 @@
                 <a:blipFill rotWithShape="0">
                   <a:blip r:embed="rId12"/>
                   <a:stretch>
-                    <a:fillRect/>
+                    <a:fillRect r="-8889"/>
                   </a:stretch>
                 </a:blipFill>
               </p:spPr>
@@ -6142,15 +6181,30 @@
                             </m:ctrlPr>
                           </m:sSubSupPr>
                           <m:e>
-                            <m:r>
-                              <a:rPr lang="en-US" sz="900" b="0" i="1" dirty="0" smtClean="0">
-                                <a:effectLst/>
-                                <a:latin typeface="Cambria Math" panose="02040503050406030204" pitchFamily="18" charset="0"/>
-                                <a:ea typeface="Calibri"/>
-                                <a:cs typeface="Times New Roman"/>
-                              </a:rPr>
-                              <m:t>h</m:t>
-                            </m:r>
+                            <m:acc>
+                              <m:accPr>
+                                <m:chr m:val="́"/>
+                                <m:ctrlPr>
+                                  <a:rPr lang="en-US" sz="900" b="0" i="1" dirty="0" smtClean="0">
+                                    <a:effectLst/>
+                                    <a:latin typeface="Cambria Math" panose="02040503050406030204" pitchFamily="18" charset="0"/>
+                                    <a:ea typeface="Calibri"/>
+                                    <a:cs typeface="Times New Roman"/>
+                                  </a:rPr>
+                                </m:ctrlPr>
+                              </m:accPr>
+                              <m:e>
+                                <m:r>
+                                  <a:rPr lang="en-US" sz="900" b="0" i="1" dirty="0" smtClean="0">
+                                    <a:effectLst/>
+                                    <a:latin typeface="Cambria Math" panose="02040503050406030204" pitchFamily="18" charset="0"/>
+                                    <a:ea typeface="Calibri"/>
+                                    <a:cs typeface="Times New Roman"/>
+                                  </a:rPr>
+                                  <m:t>h</m:t>
+                                </m:r>
+                              </m:e>
+                            </m:acc>
                           </m:e>
                           <m:sub>
                             <m:r>
@@ -6171,7 +6225,7 @@
                                 <a:ea typeface="Calibri"/>
                                 <a:cs typeface="Times New Roman"/>
                               </a:rPr>
-                              <m:t>′</m:t>
+                              <m:t> </m:t>
                             </m:r>
                           </m:sup>
                         </m:sSubSup>
@@ -13581,10 +13635,10 @@
         </p:nvGrpSpPr>
         <p:grpSpPr>
           <a:xfrm>
-            <a:off x="309563" y="5488743"/>
-            <a:ext cx="4719637" cy="1626432"/>
-            <a:chOff x="309563" y="5488743"/>
-            <a:chExt cx="4719637" cy="1626432"/>
+            <a:off x="371482" y="5455402"/>
+            <a:ext cx="4657718" cy="1659773"/>
+            <a:chOff x="371482" y="5455402"/>
+            <a:chExt cx="4657718" cy="1659773"/>
           </a:xfrm>
         </p:grpSpPr>
         <p:sp>
@@ -14329,24 +14383,30 @@
                         <m:jc m:val="centerGroup"/>
                       </m:oMathParaPr>
                       <m:oMath xmlns:m="http://schemas.openxmlformats.org/officeDocument/2006/math">
-                        <m:r>
-                          <a:rPr lang="en-US" sz="900" i="1" dirty="0" smtClean="0">
-                            <a:effectLst/>
-                            <a:latin typeface="Cambria Math" panose="02040503050406030204" pitchFamily="18" charset="0"/>
-                            <a:ea typeface="Calibri"/>
-                            <a:cs typeface="Times New Roman"/>
-                          </a:rPr>
-                          <m:t>𝐸</m:t>
-                        </m:r>
-                        <m:r>
-                          <a:rPr lang="en-US" sz="900" b="0" i="1" dirty="0" smtClean="0">
-                            <a:effectLst/>
-                            <a:latin typeface="Cambria Math" panose="02040503050406030204" pitchFamily="18" charset="0"/>
-                            <a:ea typeface="Calibri"/>
-                            <a:cs typeface="Times New Roman"/>
-                          </a:rPr>
-                          <m:t>′</m:t>
-                        </m:r>
+                        <m:acc>
+                          <m:accPr>
+                            <m:chr m:val="́"/>
+                            <m:ctrlPr>
+                              <a:rPr lang="en-US" sz="900" b="0" i="1" dirty="0" smtClean="0">
+                                <a:effectLst/>
+                                <a:latin typeface="Cambria Math" panose="02040503050406030204" pitchFamily="18" charset="0"/>
+                                <a:ea typeface="Calibri"/>
+                                <a:cs typeface="Times New Roman"/>
+                              </a:rPr>
+                            </m:ctrlPr>
+                          </m:accPr>
+                          <m:e>
+                            <m:r>
+                              <a:rPr lang="en-US" sz="900" i="1" dirty="0" smtClean="0">
+                                <a:effectLst/>
+                                <a:latin typeface="Cambria Math" panose="02040503050406030204" pitchFamily="18" charset="0"/>
+                                <a:ea typeface="Calibri"/>
+                                <a:cs typeface="Times New Roman"/>
+                              </a:rPr>
+                              <m:t>𝐸</m:t>
+                            </m:r>
+                          </m:e>
+                        </m:acc>
                       </m:oMath>
                     </m:oMathPara>
                   </a14:m>
@@ -14565,18 +14625,24 @@
                         <m:jc m:val="centerGroup"/>
                       </m:oMathParaPr>
                       <m:oMath xmlns:m="http://schemas.openxmlformats.org/officeDocument/2006/math">
-                        <m:r>
-                          <a:rPr lang="en-US" sz="1100" b="0" i="1" smtClean="0">
-                            <a:latin typeface="Cambria Math" panose="02040503050406030204" pitchFamily="18" charset="0"/>
-                          </a:rPr>
-                          <m:t>𝜔</m:t>
-                        </m:r>
-                        <m:r>
-                          <a:rPr lang="en-US" sz="1100" b="0" i="1" smtClean="0">
-                            <a:latin typeface="Cambria Math" panose="02040503050406030204" pitchFamily="18" charset="0"/>
-                          </a:rPr>
-                          <m:t>′</m:t>
-                        </m:r>
+                        <m:acc>
+                          <m:accPr>
+                            <m:chr m:val="́"/>
+                            <m:ctrlPr>
+                              <a:rPr lang="en-US" sz="1100" b="0" i="1" smtClean="0">
+                                <a:latin typeface="Cambria Math" panose="02040503050406030204" pitchFamily="18" charset="0"/>
+                              </a:rPr>
+                            </m:ctrlPr>
+                          </m:accPr>
+                          <m:e>
+                            <m:r>
+                              <a:rPr lang="en-US" sz="1100" b="0" i="1" smtClean="0">
+                                <a:latin typeface="Cambria Math" panose="02040503050406030204" pitchFamily="18" charset="0"/>
+                              </a:rPr>
+                              <m:t>𝜔</m:t>
+                            </m:r>
+                          </m:e>
+                        </m:acc>
                       </m:oMath>
                     </m:oMathPara>
                   </a14:m>
@@ -14605,7 +14671,7 @@
                 <a:blipFill rotWithShape="0">
                   <a:blip r:embed="rId57"/>
                   <a:stretch>
-                    <a:fillRect r="-4444"/>
+                    <a:fillRect r="-13333"/>
                   </a:stretch>
                 </a:blipFill>
               </p:spPr>
@@ -14738,7 +14804,7 @@
           <p:spPr>
             <a:xfrm>
               <a:off x="764345" y="6191733"/>
-              <a:ext cx="909626" cy="263933"/>
+              <a:ext cx="952505" cy="215444"/>
             </a:xfrm>
             <a:prstGeom prst="rect">
               <a:avLst/>
@@ -14753,7 +14819,7 @@
             <a:p>
               <a:r>
                 <a:rPr lang="en-US" sz="800" i="1" dirty="0" smtClean="0"/>
-                <a:t>OPTICAL AXIS</a:t>
+                <a:t>OPTICAL AXIS (OA)</a:t>
               </a:r>
               <a:endParaRPr lang="en-US" sz="800" i="1" dirty="0"/>
             </a:p>
@@ -14769,8 +14835,8 @@
               </p:nvSpPr>
               <p:spPr>
                 <a:xfrm rot="1397696">
-                  <a:off x="1200064" y="5757121"/>
-                  <a:ext cx="943977" cy="246221"/>
+                  <a:off x="1200065" y="5757121"/>
+                  <a:ext cx="943976" cy="246221"/>
                 </a:xfrm>
                 <a:prstGeom prst="rect">
                   <a:avLst/>
@@ -14790,30 +14856,15 @@
                         <m:jc m:val="centerGroup"/>
                       </m:oMathParaPr>
                       <m:oMath xmlns:m="http://schemas.openxmlformats.org/officeDocument/2006/math">
-                        <m:acc>
-                          <m:accPr>
-                            <m:chr m:val="⃗"/>
-                            <m:ctrlPr>
-                              <a:rPr lang="en-US" sz="1000" b="0" i="1" smtClean="0">
-                                <a:solidFill>
-                                  <a:srgbClr val="C00000"/>
-                                </a:solidFill>
-                                <a:latin typeface="Cambria Math" panose="02040503050406030204" pitchFamily="18" charset="0"/>
-                              </a:rPr>
-                            </m:ctrlPr>
-                          </m:accPr>
-                          <m:e>
-                            <m:r>
-                              <a:rPr lang="en-US" sz="1000" b="0" i="1" smtClean="0">
-                                <a:solidFill>
-                                  <a:srgbClr val="C00000"/>
-                                </a:solidFill>
-                                <a:latin typeface="Cambria Math" panose="02040503050406030204" pitchFamily="18" charset="0"/>
-                              </a:rPr>
-                              <m:t>𝛼</m:t>
-                            </m:r>
-                          </m:e>
-                        </m:acc>
+                        <m:r>
+                          <a:rPr lang="en-US" sz="1000" b="1" i="1" smtClean="0">
+                            <a:solidFill>
+                              <a:srgbClr val="C00000"/>
+                            </a:solidFill>
+                            <a:latin typeface="Cambria Math" panose="02040503050406030204" pitchFamily="18" charset="0"/>
+                          </a:rPr>
+                          <m:t>𝜶</m:t>
+                        </m:r>
                         <m:r>
                           <a:rPr lang="en-US" sz="1000" b="0" i="1" smtClean="0">
                             <a:solidFill>
@@ -14932,8 +14983,8 @@
               </p:nvSpPr>
               <p:spPr>
                 <a:xfrm rot="1397696">
-                  <a:off x="1200064" y="5757121"/>
-                  <a:ext cx="943977" cy="246221"/>
+                  <a:off x="1200065" y="5757121"/>
+                  <a:ext cx="943976" cy="246221"/>
                 </a:xfrm>
                 <a:prstGeom prst="rect">
                   <a:avLst/>
@@ -14970,8 +15021,8 @@
               </p:nvSpPr>
               <p:spPr>
                 <a:xfrm rot="1486279">
-                  <a:off x="3634259" y="6622840"/>
-                  <a:ext cx="1108958" cy="246221"/>
+                  <a:off x="3687967" y="6592351"/>
+                  <a:ext cx="1001556" cy="307200"/>
                 </a:xfrm>
                 <a:prstGeom prst="rect">
                   <a:avLst/>
@@ -15003,43 +15054,24 @@
                         <m:jc m:val="centerGroup"/>
                       </m:oMathParaPr>
                       <m:oMath xmlns:m="http://schemas.openxmlformats.org/officeDocument/2006/math">
-                        <m:sSup>
-                          <m:sSupPr>
+                        <m:acc>
+                          <m:accPr>
+                            <m:chr m:val="́"/>
                             <m:ctrlPr>
-                              <a:rPr lang="en-US" sz="1000" b="0" i="1" smtClean="0">
+                              <a:rPr lang="en-US" sz="1000" b="1" i="1" smtClean="0">
                                 <a:latin typeface="Cambria Math" panose="02040503050406030204" pitchFamily="18" charset="0"/>
                               </a:rPr>
                             </m:ctrlPr>
-                          </m:sSupPr>
+                          </m:accPr>
                           <m:e>
-                            <m:acc>
-                              <m:accPr>
-                                <m:chr m:val="⃗"/>
-                                <m:ctrlPr>
-                                  <a:rPr lang="en-US" sz="1000" i="1" smtClean="0">
-                                    <a:latin typeface="Cambria Math" panose="02040503050406030204" pitchFamily="18" charset="0"/>
-                                  </a:rPr>
-                                </m:ctrlPr>
-                              </m:accPr>
-                              <m:e>
-                                <m:r>
-                                  <a:rPr lang="en-US" sz="1000">
-                                    <a:latin typeface="Cambria Math" panose="02040503050406030204" pitchFamily="18" charset="0"/>
-                                  </a:rPr>
-                                  <m:t>𝛼</m:t>
-                                </m:r>
-                              </m:e>
-                            </m:acc>
-                          </m:e>
-                          <m:sup>
                             <m:r>
-                              <a:rPr lang="en-US" sz="1000" b="0" i="1" smtClean="0">
+                              <a:rPr lang="en-US" sz="1000" b="1" i="1" smtClean="0">
                                 <a:latin typeface="Cambria Math" panose="02040503050406030204" pitchFamily="18" charset="0"/>
                               </a:rPr>
-                              <m:t>′</m:t>
+                              <m:t>𝜶</m:t>
                             </m:r>
-                          </m:sup>
-                        </m:sSup>
+                          </m:e>
+                        </m:acc>
                         <m:r>
                           <a:rPr lang="en-US" sz="1000">
                             <a:latin typeface="Cambria Math" panose="02040503050406030204" pitchFamily="18" charset="0"/>
@@ -15066,93 +15098,66 @@
                                 </m:ctrlPr>
                               </m:dPr>
                               <m:e>
-                                <m:sSup>
-                                  <m:sSupPr>
-                                    <m:ctrlPr>
-                                      <a:rPr lang="en-US" sz="1000" i="1">
-                                        <a:latin typeface="Cambria Math" panose="02040503050406030204" pitchFamily="18" charset="0"/>
-                                      </a:rPr>
-                                    </m:ctrlPr>
-                                  </m:sSupPr>
-                                  <m:e>
-                                    <m:r>
-                                      <a:rPr lang="en-US" sz="1000">
-                                        <a:latin typeface="Cambria Math" panose="02040503050406030204" pitchFamily="18" charset="0"/>
-                                      </a:rPr>
-                                      <m:t>𝛼</m:t>
-                                    </m:r>
-                                  </m:e>
-                                  <m:sup>
-                                    <m:r>
-                                      <a:rPr lang="en-US" sz="1000" i="1">
-                                        <a:latin typeface="Cambria Math" panose="02040503050406030204" pitchFamily="18" charset="0"/>
-                                      </a:rPr>
-                                      <m:t>′</m:t>
-                                    </m:r>
-                                  </m:sup>
-                                </m:sSup>
+                                <m:r>
+                                  <a:rPr lang="en-US" sz="1000" b="0" i="1" smtClean="0">
+                                    <a:latin typeface="Cambria Math" panose="02040503050406030204" pitchFamily="18" charset="0"/>
+                                  </a:rPr>
+                                  <m:t>𝛼</m:t>
+                                </m:r>
+                                <m:r>
+                                  <a:rPr lang="en-US" sz="1000" b="0" i="1" smtClean="0">
+                                    <a:latin typeface="Cambria Math" panose="02040503050406030204" pitchFamily="18" charset="0"/>
+                                  </a:rPr>
+                                  <m:t> ́</m:t>
+                                </m:r>
                                 <m:r>
                                   <a:rPr lang="en-US" sz="1000">
                                     <a:latin typeface="Cambria Math" panose="02040503050406030204" pitchFamily="18" charset="0"/>
                                   </a:rPr>
                                   <m:t>, </m:t>
                                 </m:r>
-                                <m:sSup>
-                                  <m:sSupPr>
+                                <m:acc>
+                                  <m:accPr>
+                                    <m:chr m:val="́"/>
                                     <m:ctrlPr>
-                                      <a:rPr lang="en-US" sz="1000" i="1">
+                                      <a:rPr lang="en-US" sz="1000" b="0" i="1" smtClean="0">
                                         <a:latin typeface="Cambria Math" panose="02040503050406030204" pitchFamily="18" charset="0"/>
                                       </a:rPr>
                                     </m:ctrlPr>
-                                  </m:sSupPr>
+                                  </m:accPr>
                                   <m:e>
                                     <m:r>
-                                      <a:rPr lang="en-US" sz="1000">
+                                      <a:rPr lang="en-US" sz="1000" b="0" i="1" smtClean="0">
                                         <a:latin typeface="Cambria Math" panose="02040503050406030204" pitchFamily="18" charset="0"/>
                                       </a:rPr>
                                       <m:t>𝛽</m:t>
                                     </m:r>
                                   </m:e>
-                                  <m:sup>
-                                    <m:r>
-                                      <a:rPr lang="en-US" sz="1000" i="1">
-                                        <a:latin typeface="Cambria Math" panose="02040503050406030204" pitchFamily="18" charset="0"/>
-                                      </a:rPr>
-                                      <m:t>′</m:t>
-                                    </m:r>
-                                  </m:sup>
-                                </m:sSup>
+                                </m:acc>
                                 <m:r>
                                   <a:rPr lang="en-US" sz="1000">
                                     <a:latin typeface="Cambria Math" panose="02040503050406030204" pitchFamily="18" charset="0"/>
                                   </a:rPr>
                                   <m:t>,</m:t>
                                 </m:r>
-                                <m:sSup>
-                                  <m:sSupPr>
+                                <m:acc>
+                                  <m:accPr>
+                                    <m:chr m:val="́"/>
                                     <m:ctrlPr>
-                                      <a:rPr lang="en-US" sz="1000" i="1">
+                                      <a:rPr lang="en-US" sz="1000" b="0" i="1" smtClean="0">
                                         <a:latin typeface="Cambria Math" panose="02040503050406030204" pitchFamily="18" charset="0"/>
                                       </a:rPr>
                                     </m:ctrlPr>
-                                  </m:sSupPr>
+                                  </m:accPr>
                                   <m:e>
                                     <m:r>
-                                      <a:rPr lang="en-US" sz="1000">
+                                      <a:rPr lang="en-US" sz="1000" b="0" i="1" smtClean="0">
                                         <a:latin typeface="Cambria Math" panose="02040503050406030204" pitchFamily="18" charset="0"/>
                                       </a:rPr>
                                       <m:t>𝛾</m:t>
                                     </m:r>
                                   </m:e>
-                                  <m:sup>
-                                    <m:r>
-                                      <a:rPr lang="en-US" sz="1000" i="1">
-                                        <a:latin typeface="Cambria Math" panose="02040503050406030204" pitchFamily="18" charset="0"/>
-                                      </a:rPr>
-                                      <m:t>′</m:t>
-                                    </m:r>
-                                  </m:sup>
-                                </m:sSup>
+                                </m:acc>
                               </m:e>
                             </m:d>
                           </m:e>
@@ -15184,8 +15189,8 @@
               </p:nvSpPr>
               <p:spPr>
                 <a:xfrm rot="1486279">
-                  <a:off x="3634259" y="6622840"/>
-                  <a:ext cx="1108958" cy="246221"/>
+                  <a:off x="3687967" y="6592351"/>
+                  <a:ext cx="1001556" cy="307200"/>
                 </a:xfrm>
                 <a:prstGeom prst="rect">
                   <a:avLst/>
@@ -15273,8 +15278,8 @@
               </p:nvSpPr>
               <p:spPr>
                 <a:xfrm>
-                  <a:off x="309563" y="5488743"/>
-                  <a:ext cx="379112" cy="497316"/>
+                  <a:off x="371482" y="5455402"/>
+                  <a:ext cx="379112" cy="246221"/>
                 </a:xfrm>
                 <a:prstGeom prst="rect">
                   <a:avLst/>
@@ -15294,98 +15299,25 @@
                         <m:jc m:val="centerGroup"/>
                       </m:oMathParaPr>
                       <m:oMath xmlns:m="http://schemas.openxmlformats.org/officeDocument/2006/math">
-                        <m:d>
-                          <m:dPr>
-                            <m:begChr m:val="["/>
-                            <m:endChr m:val="]"/>
-                            <m:ctrlPr>
-                              <a:rPr lang="en-US" sz="1000" b="0" i="1" smtClean="0">
-                                <a:solidFill>
-                                  <a:schemeClr val="tx1">
-                                    <a:lumMod val="95000"/>
-                                    <a:lumOff val="5000"/>
-                                  </a:schemeClr>
-                                </a:solidFill>
-                                <a:latin typeface="Cambria Math" panose="02040503050406030204" pitchFamily="18" charset="0"/>
-                              </a:rPr>
-                            </m:ctrlPr>
-                          </m:dPr>
-                          <m:e>
-                            <m:eqArr>
-                              <m:eqArrPr>
-                                <m:ctrlPr>
-                                  <a:rPr lang="en-US" sz="1000" b="0" i="1" smtClean="0">
-                                    <a:solidFill>
-                                      <a:schemeClr val="tx1">
-                                        <a:lumMod val="95000"/>
-                                        <a:lumOff val="5000"/>
-                                      </a:schemeClr>
-                                    </a:solidFill>
-                                    <a:latin typeface="Cambria Math" panose="02040503050406030204" pitchFamily="18" charset="0"/>
-                                  </a:rPr>
-                                </m:ctrlPr>
-                              </m:eqArrPr>
-                              <m:e>
-                                <m:r>
-                                  <a:rPr lang="en-US" sz="1000" b="0" i="1" smtClean="0">
-                                    <a:solidFill>
-                                      <a:schemeClr val="tx1">
-                                        <a:lumMod val="95000"/>
-                                        <a:lumOff val="5000"/>
-                                      </a:schemeClr>
-                                    </a:solidFill>
-                                    <a:latin typeface="Cambria Math" panose="02040503050406030204" pitchFamily="18" charset="0"/>
-                                  </a:rPr>
-                                  <m:t>𝑋</m:t>
-                                </m:r>
-                                <m:r>
-                                  <a:rPr lang="en-US" sz="1000" b="0" i="1" smtClean="0">
-                                    <a:solidFill>
-                                      <a:schemeClr val="tx1">
-                                        <a:lumMod val="95000"/>
-                                        <a:lumOff val="5000"/>
-                                      </a:schemeClr>
-                                    </a:solidFill>
-                                    <a:latin typeface="Cambria Math" panose="02040503050406030204" pitchFamily="18" charset="0"/>
-                                  </a:rPr>
-                                  <m:t> </m:t>
-                                </m:r>
-                              </m:e>
-                              <m:e>
-                                <m:r>
-                                  <a:rPr lang="en-US" sz="1000" b="0" i="1" smtClean="0">
-                                    <a:solidFill>
-                                      <a:schemeClr val="tx1">
-                                        <a:lumMod val="95000"/>
-                                        <a:lumOff val="5000"/>
-                                      </a:schemeClr>
-                                    </a:solidFill>
-                                    <a:latin typeface="Cambria Math" panose="02040503050406030204" pitchFamily="18" charset="0"/>
-                                  </a:rPr>
-                                  <m:t>𝑌</m:t>
-                                </m:r>
-                              </m:e>
-                              <m:e>
-                                <m:r>
-                                  <a:rPr lang="en-US" sz="1000" b="0" i="1" smtClean="0">
-                                    <a:solidFill>
-                                      <a:schemeClr val="tx1">
-                                        <a:lumMod val="95000"/>
-                                        <a:lumOff val="5000"/>
-                                      </a:schemeClr>
-                                    </a:solidFill>
-                                    <a:latin typeface="Cambria Math" panose="02040503050406030204" pitchFamily="18" charset="0"/>
-                                  </a:rPr>
-                                  <m:t>𝑍</m:t>
-                                </m:r>
-                              </m:e>
-                            </m:eqArr>
-                          </m:e>
-                        </m:d>
+                        <m:r>
+                          <m:rPr>
+                            <m:nor/>
+                          </m:rPr>
+                          <a:rPr lang="en-US" sz="1000" b="1" i="0" smtClean="0">
+                            <a:solidFill>
+                              <a:schemeClr val="tx1">
+                                <a:lumMod val="95000"/>
+                                <a:lumOff val="5000"/>
+                              </a:schemeClr>
+                            </a:solidFill>
+                            <a:latin typeface="Cambria Math" panose="02040503050406030204" pitchFamily="18" charset="0"/>
+                          </a:rPr>
+                          <m:t>x</m:t>
+                        </m:r>
                       </m:oMath>
                     </m:oMathPara>
                   </a14:m>
-                  <a:endParaRPr lang="en-US" sz="1000" dirty="0">
+                  <a:endParaRPr lang="en-US" sz="1000" b="1" dirty="0">
                     <a:solidFill>
                       <a:schemeClr val="tx1">
                         <a:lumMod val="95000"/>
@@ -15408,8 +15340,8 @@
               </p:nvSpPr>
               <p:spPr>
                 <a:xfrm>
-                  <a:off x="309563" y="5488743"/>
-                  <a:ext cx="379112" cy="497316"/>
+                  <a:off x="371482" y="5455402"/>
+                  <a:ext cx="379112" cy="246221"/>
                 </a:xfrm>
                 <a:prstGeom prst="rect">
                   <a:avLst/>
@@ -15825,7 +15757,7 @@
               <p:spPr>
                 <a:xfrm>
                   <a:off x="1581408" y="6376767"/>
-                  <a:ext cx="301749" cy="253916"/>
+                  <a:ext cx="281424" cy="246221"/>
                 </a:xfrm>
                 <a:prstGeom prst="rect">
                   <a:avLst/>
@@ -15849,7 +15781,7 @@
                           <a:rPr lang="en-US" sz="1000" b="0" i="1" smtClean="0">
                             <a:latin typeface="Cambria Math" panose="02040503050406030204" pitchFamily="18" charset="0"/>
                           </a:rPr>
-                          <m:t>𝑍</m:t>
+                          <m:t>𝑧</m:t>
                         </m:r>
                       </m:oMath>
                     </m:oMathPara>
@@ -15874,7 +15806,7 @@
               <p:spPr>
                 <a:xfrm>
                   <a:off x="1581408" y="6376767"/>
-                  <a:ext cx="301749" cy="253916"/>
+                  <a:ext cx="281424" cy="246221"/>
                 </a:xfrm>
                 <a:prstGeom prst="rect">
                   <a:avLst/>
@@ -23961,7 +23893,31 @@
                               <a:rPr lang="en-US" sz="900" b="0" i="1" smtClean="0">
                                 <a:latin typeface="Cambria Math" panose="02040503050406030204" pitchFamily="18" charset="0"/>
                               </a:rPr>
-                              <m:t>(2,2)</m:t>
+                              <m:t>(</m:t>
+                            </m:r>
+                            <m:r>
+                              <a:rPr lang="en-US" sz="900" b="0" i="1" smtClean="0">
+                                <a:latin typeface="Cambria Math" panose="02040503050406030204" pitchFamily="18" charset="0"/>
+                              </a:rPr>
+                              <m:t>2</m:t>
+                            </m:r>
+                            <m:r>
+                              <a:rPr lang="en-US" sz="900" b="0" i="1" smtClean="0">
+                                <a:latin typeface="Cambria Math" panose="02040503050406030204" pitchFamily="18" charset="0"/>
+                              </a:rPr>
+                              <m:t>,</m:t>
+                            </m:r>
+                            <m:r>
+                              <a:rPr lang="en-US" sz="900" b="0" i="1" smtClean="0">
+                                <a:latin typeface="Cambria Math" panose="02040503050406030204" pitchFamily="18" charset="0"/>
+                              </a:rPr>
+                              <m:t>2</m:t>
+                            </m:r>
+                            <m:r>
+                              <a:rPr lang="en-US" sz="900" b="0" i="1" smtClean="0">
+                                <a:latin typeface="Cambria Math" panose="02040503050406030204" pitchFamily="18" charset="0"/>
+                              </a:rPr>
+                              <m:t>)</m:t>
                             </m:r>
                           </m:e>
                         </m:sPre>
@@ -24155,7 +24111,31 @@
                               <a:rPr lang="en-US" sz="900" b="0" i="1" smtClean="0">
                                 <a:latin typeface="Cambria Math" panose="02040503050406030204" pitchFamily="18" charset="0"/>
                               </a:rPr>
-                              <m:t>(2,2)</m:t>
+                              <m:t>(</m:t>
+                            </m:r>
+                            <m:r>
+                              <a:rPr lang="en-US" sz="900" b="0" i="1" smtClean="0">
+                                <a:latin typeface="Cambria Math" panose="02040503050406030204" pitchFamily="18" charset="0"/>
+                              </a:rPr>
+                              <m:t>2</m:t>
+                            </m:r>
+                            <m:r>
+                              <a:rPr lang="en-US" sz="900" b="0" i="1" smtClean="0">
+                                <a:latin typeface="Cambria Math" panose="02040503050406030204" pitchFamily="18" charset="0"/>
+                              </a:rPr>
+                              <m:t>,</m:t>
+                            </m:r>
+                            <m:r>
+                              <a:rPr lang="en-US" sz="900" b="0" i="1" smtClean="0">
+                                <a:latin typeface="Cambria Math" panose="02040503050406030204" pitchFamily="18" charset="0"/>
+                              </a:rPr>
+                              <m:t>2</m:t>
+                            </m:r>
+                            <m:r>
+                              <a:rPr lang="en-US" sz="900" b="0" i="1" smtClean="0">
+                                <a:latin typeface="Cambria Math" panose="02040503050406030204" pitchFamily="18" charset="0"/>
+                              </a:rPr>
+                              <m:t>)</m:t>
                             </m:r>
                           </m:e>
                         </m:sPre>
@@ -28131,10 +28111,10 @@
         </p:nvGrpSpPr>
         <p:grpSpPr>
           <a:xfrm>
-            <a:off x="379782" y="5117139"/>
-            <a:ext cx="4757737" cy="1787381"/>
-            <a:chOff x="379782" y="5117139"/>
-            <a:chExt cx="4757737" cy="1787381"/>
+            <a:off x="384544" y="5109953"/>
+            <a:ext cx="4752975" cy="1794567"/>
+            <a:chOff x="384544" y="5109953"/>
+            <a:chExt cx="4752975" cy="1794567"/>
           </a:xfrm>
         </p:grpSpPr>
         <p:sp>
@@ -28923,24 +28903,30 @@
                         <m:jc m:val="centerGroup"/>
                       </m:oMathParaPr>
                       <m:oMath xmlns:m="http://schemas.openxmlformats.org/officeDocument/2006/math">
-                        <m:r>
-                          <a:rPr lang="en-US" sz="900" i="1" dirty="0" smtClean="0">
-                            <a:effectLst/>
-                            <a:latin typeface="Cambria Math" panose="02040503050406030204" pitchFamily="18" charset="0"/>
-                            <a:ea typeface="Calibri"/>
-                            <a:cs typeface="Times New Roman"/>
-                          </a:rPr>
-                          <m:t>𝐸</m:t>
-                        </m:r>
-                        <m:r>
-                          <a:rPr lang="en-US" sz="900" b="0" i="1" dirty="0" smtClean="0">
-                            <a:effectLst/>
-                            <a:latin typeface="Cambria Math" panose="02040503050406030204" pitchFamily="18" charset="0"/>
-                            <a:ea typeface="Calibri"/>
-                            <a:cs typeface="Times New Roman"/>
-                          </a:rPr>
-                          <m:t>′</m:t>
-                        </m:r>
+                        <m:acc>
+                          <m:accPr>
+                            <m:chr m:val="́"/>
+                            <m:ctrlPr>
+                              <a:rPr lang="en-US" sz="900" b="0" i="1" dirty="0" smtClean="0">
+                                <a:effectLst/>
+                                <a:latin typeface="Cambria Math" panose="02040503050406030204" pitchFamily="18" charset="0"/>
+                                <a:ea typeface="Calibri"/>
+                                <a:cs typeface="Times New Roman"/>
+                              </a:rPr>
+                            </m:ctrlPr>
+                          </m:accPr>
+                          <m:e>
+                            <m:r>
+                              <a:rPr lang="en-US" sz="900" i="1" dirty="0" smtClean="0">
+                                <a:effectLst/>
+                                <a:latin typeface="Cambria Math" panose="02040503050406030204" pitchFamily="18" charset="0"/>
+                                <a:ea typeface="Calibri"/>
+                                <a:cs typeface="Times New Roman"/>
+                              </a:rPr>
+                              <m:t>𝐸</m:t>
+                            </m:r>
+                          </m:e>
+                        </m:acc>
                       </m:oMath>
                     </m:oMathPara>
                   </a14:m>
@@ -29159,18 +29145,24 @@
                         <m:jc m:val="centerGroup"/>
                       </m:oMathParaPr>
                       <m:oMath xmlns:m="http://schemas.openxmlformats.org/officeDocument/2006/math">
-                        <m:r>
-                          <a:rPr lang="en-US" sz="1100" b="0" i="1" smtClean="0">
-                            <a:latin typeface="Cambria Math" panose="02040503050406030204" pitchFamily="18" charset="0"/>
-                          </a:rPr>
-                          <m:t>𝜔</m:t>
-                        </m:r>
-                        <m:r>
-                          <a:rPr lang="en-US" sz="1100" b="0" i="1" smtClean="0">
-                            <a:latin typeface="Cambria Math" panose="02040503050406030204" pitchFamily="18" charset="0"/>
-                          </a:rPr>
-                          <m:t>′</m:t>
-                        </m:r>
+                        <m:acc>
+                          <m:accPr>
+                            <m:chr m:val="́"/>
+                            <m:ctrlPr>
+                              <a:rPr lang="en-US" sz="1100" b="0" i="1" smtClean="0">
+                                <a:latin typeface="Cambria Math" panose="02040503050406030204" pitchFamily="18" charset="0"/>
+                              </a:rPr>
+                            </m:ctrlPr>
+                          </m:accPr>
+                          <m:e>
+                            <m:r>
+                              <a:rPr lang="en-US" sz="1100" b="0" i="1" smtClean="0">
+                                <a:latin typeface="Cambria Math" panose="02040503050406030204" pitchFamily="18" charset="0"/>
+                              </a:rPr>
+                              <m:t>𝜔</m:t>
+                            </m:r>
+                          </m:e>
+                        </m:acc>
                       </m:oMath>
                     </m:oMathPara>
                   </a14:m>
@@ -29199,7 +29191,7 @@
                 <a:blipFill rotWithShape="0">
                   <a:blip r:embed="rId53"/>
                   <a:stretch>
-                    <a:fillRect r="-4444"/>
+                    <a:fillRect r="-13333"/>
                   </a:stretch>
                 </a:blipFill>
               </p:spPr>
@@ -29323,8 +29315,8 @@
             </a:p>
           </p:txBody>
         </p:sp>
-        <mc:AlternateContent xmlns:mc="http://schemas.openxmlformats.org/markup-compatibility/2006" xmlns:a14="http://schemas.microsoft.com/office/drawing/2010/main">
-          <mc:Choice Requires="a14">
+        <mc:AlternateContent xmlns:mc="http://schemas.openxmlformats.org/markup-compatibility/2006">
+          <mc:Choice xmlns:a14="http://schemas.microsoft.com/office/drawing/2010/main" Requires="a14">
             <p:sp>
               <p:nvSpPr>
                 <p:cNvPr id="235" name="TextBox 234"/>
@@ -29333,8 +29325,8 @@
               </p:nvSpPr>
               <p:spPr>
                 <a:xfrm rot="1522105">
-                  <a:off x="1270283" y="5416435"/>
-                  <a:ext cx="943977" cy="246221"/>
+                  <a:off x="1270284" y="5416435"/>
+                  <a:ext cx="943976" cy="246221"/>
                 </a:xfrm>
                 <a:prstGeom prst="rect">
                   <a:avLst/>
@@ -29354,30 +29346,15 @@
                         <m:jc m:val="centerGroup"/>
                       </m:oMathParaPr>
                       <m:oMath xmlns:m="http://schemas.openxmlformats.org/officeDocument/2006/math">
-                        <m:acc>
-                          <m:accPr>
-                            <m:chr m:val="⃗"/>
-                            <m:ctrlPr>
-                              <a:rPr lang="en-US" sz="1000" b="0" i="1" smtClean="0">
-                                <a:solidFill>
-                                  <a:srgbClr val="C00000"/>
-                                </a:solidFill>
-                                <a:latin typeface="Cambria Math" panose="02040503050406030204" pitchFamily="18" charset="0"/>
-                              </a:rPr>
-                            </m:ctrlPr>
-                          </m:accPr>
-                          <m:e>
-                            <m:r>
-                              <a:rPr lang="en-US" sz="1000" b="0" i="1" smtClean="0">
-                                <a:solidFill>
-                                  <a:srgbClr val="C00000"/>
-                                </a:solidFill>
-                                <a:latin typeface="Cambria Math" panose="02040503050406030204" pitchFamily="18" charset="0"/>
-                              </a:rPr>
-                              <m:t>𝛼</m:t>
-                            </m:r>
-                          </m:e>
-                        </m:acc>
+                        <m:r>
+                          <a:rPr lang="en-US" sz="1000" b="1" i="1" smtClean="0">
+                            <a:solidFill>
+                              <a:srgbClr val="C00000"/>
+                            </a:solidFill>
+                            <a:latin typeface="Cambria Math" panose="02040503050406030204" pitchFamily="18" charset="0"/>
+                          </a:rPr>
+                          <m:t>𝜶</m:t>
+                        </m:r>
                         <m:r>
                           <a:rPr lang="en-US" sz="1000" b="0" i="1" smtClean="0">
                             <a:solidFill>
@@ -29485,7 +29462,7 @@
               </p:txBody>
             </p:sp>
           </mc:Choice>
-          <mc:Fallback xmlns="">
+          <mc:Fallback>
             <p:sp>
               <p:nvSpPr>
                 <p:cNvPr id="235" name="TextBox 234"/>
@@ -29496,8 +29473,8 @@
               </p:nvSpPr>
               <p:spPr>
                 <a:xfrm rot="1522105">
-                  <a:off x="1270283" y="5416435"/>
-                  <a:ext cx="943977" cy="246221"/>
+                  <a:off x="1270284" y="5416435"/>
+                  <a:ext cx="943976" cy="246221"/>
                 </a:xfrm>
                 <a:prstGeom prst="rect">
                   <a:avLst/>
@@ -29534,8 +29511,8 @@
               </p:nvSpPr>
               <p:spPr>
                 <a:xfrm rot="1486279">
-                  <a:off x="3687225" y="6195889"/>
-                  <a:ext cx="1108958" cy="246221"/>
+                  <a:off x="3751666" y="6170177"/>
+                  <a:ext cx="980076" cy="297646"/>
                 </a:xfrm>
                 <a:prstGeom prst="rect">
                   <a:avLst/>
@@ -29567,43 +29544,24 @@
                         <m:jc m:val="centerGroup"/>
                       </m:oMathParaPr>
                       <m:oMath xmlns:m="http://schemas.openxmlformats.org/officeDocument/2006/math">
-                        <m:sSup>
-                          <m:sSupPr>
+                        <m:acc>
+                          <m:accPr>
+                            <m:chr m:val="́"/>
                             <m:ctrlPr>
-                              <a:rPr lang="en-US" sz="1000" b="0" i="1" smtClean="0">
+                              <a:rPr lang="en-US" sz="1000" b="1" i="1">
                                 <a:latin typeface="Cambria Math" panose="02040503050406030204" pitchFamily="18" charset="0"/>
                               </a:rPr>
                             </m:ctrlPr>
-                          </m:sSupPr>
+                          </m:accPr>
                           <m:e>
-                            <m:acc>
-                              <m:accPr>
-                                <m:chr m:val="⃗"/>
-                                <m:ctrlPr>
-                                  <a:rPr lang="en-US" sz="1000" i="1" smtClean="0">
-                                    <a:latin typeface="Cambria Math" panose="02040503050406030204" pitchFamily="18" charset="0"/>
-                                  </a:rPr>
-                                </m:ctrlPr>
-                              </m:accPr>
-                              <m:e>
-                                <m:r>
-                                  <a:rPr lang="en-US" sz="1000">
-                                    <a:latin typeface="Cambria Math" panose="02040503050406030204" pitchFamily="18" charset="0"/>
-                                  </a:rPr>
-                                  <m:t>𝛼</m:t>
-                                </m:r>
-                              </m:e>
-                            </m:acc>
-                          </m:e>
-                          <m:sup>
                             <m:r>
-                              <a:rPr lang="en-US" sz="1000" b="0" i="1" smtClean="0">
+                              <a:rPr lang="en-US" sz="1000" b="1">
                                 <a:latin typeface="Cambria Math" panose="02040503050406030204" pitchFamily="18" charset="0"/>
                               </a:rPr>
-                              <m:t>′</m:t>
+                              <m:t>𝜶</m:t>
                             </m:r>
-                          </m:sup>
-                        </m:sSup>
+                          </m:e>
+                        </m:acc>
                         <m:r>
                           <a:rPr lang="en-US" sz="1000">
                             <a:latin typeface="Cambria Math" panose="02040503050406030204" pitchFamily="18" charset="0"/>
@@ -29613,7 +29571,7 @@
                         <m:sSup>
                           <m:sSupPr>
                             <m:ctrlPr>
-                              <a:rPr lang="en-US" sz="1000" b="0" i="1" smtClean="0">
+                              <a:rPr lang="en-US" sz="1000" i="1">
                                 <a:latin typeface="Cambria Math" panose="02040503050406030204" pitchFamily="18" charset="0"/>
                               </a:rPr>
                             </m:ctrlPr>
@@ -29624,51 +29582,39 @@
                                 <m:begChr m:val="["/>
                                 <m:endChr m:val="]"/>
                                 <m:ctrlPr>
-                                  <a:rPr lang="en-US" sz="1000" b="0" i="1" smtClean="0">
+                                  <a:rPr lang="en-US" sz="1000" i="1">
                                     <a:latin typeface="Cambria Math" panose="02040503050406030204" pitchFamily="18" charset="0"/>
                                   </a:rPr>
                                 </m:ctrlPr>
                               </m:dPr>
                               <m:e>
-                                <m:sSup>
-                                  <m:sSupPr>
-                                    <m:ctrlPr>
-                                      <a:rPr lang="en-US" sz="1000" i="1">
-                                        <a:latin typeface="Cambria Math" panose="02040503050406030204" pitchFamily="18" charset="0"/>
-                                      </a:rPr>
-                                    </m:ctrlPr>
-                                  </m:sSupPr>
-                                  <m:e>
-                                    <m:r>
-                                      <a:rPr lang="en-US" sz="1000">
-                                        <a:latin typeface="Cambria Math" panose="02040503050406030204" pitchFamily="18" charset="0"/>
-                                      </a:rPr>
-                                      <m:t>𝛼</m:t>
-                                    </m:r>
-                                  </m:e>
-                                  <m:sup>
-                                    <m:r>
-                                      <a:rPr lang="en-US" sz="1000" i="1">
-                                        <a:latin typeface="Cambria Math" panose="02040503050406030204" pitchFamily="18" charset="0"/>
-                                      </a:rPr>
-                                      <m:t>′</m:t>
-                                    </m:r>
-                                  </m:sup>
-                                </m:sSup>
+                                <m:r>
+                                  <a:rPr lang="en-US" sz="1000">
+                                    <a:latin typeface="Cambria Math" panose="02040503050406030204" pitchFamily="18" charset="0"/>
+                                  </a:rPr>
+                                  <m:t>𝛼</m:t>
+                                </m:r>
+                                <m:r>
+                                  <a:rPr lang="en-US" sz="1000">
+                                    <a:latin typeface="Cambria Math" panose="02040503050406030204" pitchFamily="18" charset="0"/>
+                                  </a:rPr>
+                                  <m:t> ́</m:t>
+                                </m:r>
                                 <m:r>
                                   <a:rPr lang="en-US" sz="1000">
                                     <a:latin typeface="Cambria Math" panose="02040503050406030204" pitchFamily="18" charset="0"/>
                                   </a:rPr>
                                   <m:t>, </m:t>
                                 </m:r>
-                                <m:sSup>
-                                  <m:sSupPr>
+                                <m:acc>
+                                  <m:accPr>
+                                    <m:chr m:val="́"/>
                                     <m:ctrlPr>
                                       <a:rPr lang="en-US" sz="1000" i="1">
                                         <a:latin typeface="Cambria Math" panose="02040503050406030204" pitchFamily="18" charset="0"/>
                                       </a:rPr>
                                     </m:ctrlPr>
-                                  </m:sSupPr>
+                                  </m:accPr>
                                   <m:e>
                                     <m:r>
                                       <a:rPr lang="en-US" sz="1000">
@@ -29677,29 +29623,22 @@
                                       <m:t>𝛽</m:t>
                                     </m:r>
                                   </m:e>
-                                  <m:sup>
-                                    <m:r>
-                                      <a:rPr lang="en-US" sz="1000" i="1">
-                                        <a:latin typeface="Cambria Math" panose="02040503050406030204" pitchFamily="18" charset="0"/>
-                                      </a:rPr>
-                                      <m:t>′</m:t>
-                                    </m:r>
-                                  </m:sup>
-                                </m:sSup>
+                                </m:acc>
                                 <m:r>
                                   <a:rPr lang="en-US" sz="1000">
                                     <a:latin typeface="Cambria Math" panose="02040503050406030204" pitchFamily="18" charset="0"/>
                                   </a:rPr>
                                   <m:t>,</m:t>
                                 </m:r>
-                                <m:sSup>
-                                  <m:sSupPr>
+                                <m:acc>
+                                  <m:accPr>
+                                    <m:chr m:val="́"/>
                                     <m:ctrlPr>
                                       <a:rPr lang="en-US" sz="1000" i="1">
                                         <a:latin typeface="Cambria Math" panose="02040503050406030204" pitchFamily="18" charset="0"/>
                                       </a:rPr>
                                     </m:ctrlPr>
-                                  </m:sSupPr>
+                                  </m:accPr>
                                   <m:e>
                                     <m:r>
                                       <a:rPr lang="en-US" sz="1000">
@@ -29708,21 +29647,13 @@
                                       <m:t>𝛾</m:t>
                                     </m:r>
                                   </m:e>
-                                  <m:sup>
-                                    <m:r>
-                                      <a:rPr lang="en-US" sz="1000" i="1">
-                                        <a:latin typeface="Cambria Math" panose="02040503050406030204" pitchFamily="18" charset="0"/>
-                                      </a:rPr>
-                                      <m:t>′</m:t>
-                                    </m:r>
-                                  </m:sup>
-                                </m:sSup>
+                                </m:acc>
                               </m:e>
                             </m:d>
                           </m:e>
                           <m:sup>
                             <m:r>
-                              <a:rPr lang="en-US" sz="1000" b="0" i="1" smtClean="0">
+                              <a:rPr lang="en-US" sz="1000">
                                 <a:latin typeface="Cambria Math" panose="02040503050406030204" pitchFamily="18" charset="0"/>
                               </a:rPr>
                               <m:t>𝑇</m:t>
@@ -29748,8 +29679,8 @@
               </p:nvSpPr>
               <p:spPr>
                 <a:xfrm rot="1486279">
-                  <a:off x="3687225" y="6195889"/>
-                  <a:ext cx="1108958" cy="246221"/>
+                  <a:off x="3751666" y="6170177"/>
+                  <a:ext cx="980076" cy="297646"/>
                 </a:xfrm>
                 <a:prstGeom prst="rect">
                   <a:avLst/>
@@ -29837,8 +29768,8 @@
               </p:nvSpPr>
               <p:spPr>
                 <a:xfrm>
-                  <a:off x="379782" y="5148057"/>
-                  <a:ext cx="379112" cy="497316"/>
+                  <a:off x="432175" y="5109953"/>
+                  <a:ext cx="379112" cy="246221"/>
                 </a:xfrm>
                 <a:prstGeom prst="rect">
                   <a:avLst/>
@@ -29858,98 +29789,25 @@
                         <m:jc m:val="centerGroup"/>
                       </m:oMathParaPr>
                       <m:oMath xmlns:m="http://schemas.openxmlformats.org/officeDocument/2006/math">
-                        <m:d>
-                          <m:dPr>
-                            <m:begChr m:val="["/>
-                            <m:endChr m:val="]"/>
-                            <m:ctrlPr>
-                              <a:rPr lang="en-US" sz="1000" b="0" i="1" smtClean="0">
-                                <a:solidFill>
-                                  <a:schemeClr val="tx1">
-                                    <a:lumMod val="95000"/>
-                                    <a:lumOff val="5000"/>
-                                  </a:schemeClr>
-                                </a:solidFill>
-                                <a:latin typeface="Cambria Math" panose="02040503050406030204" pitchFamily="18" charset="0"/>
-                              </a:rPr>
-                            </m:ctrlPr>
-                          </m:dPr>
-                          <m:e>
-                            <m:eqArr>
-                              <m:eqArrPr>
-                                <m:ctrlPr>
-                                  <a:rPr lang="en-US" sz="1000" b="0" i="1" smtClean="0">
-                                    <a:solidFill>
-                                      <a:schemeClr val="tx1">
-                                        <a:lumMod val="95000"/>
-                                        <a:lumOff val="5000"/>
-                                      </a:schemeClr>
-                                    </a:solidFill>
-                                    <a:latin typeface="Cambria Math" panose="02040503050406030204" pitchFamily="18" charset="0"/>
-                                  </a:rPr>
-                                </m:ctrlPr>
-                              </m:eqArrPr>
-                              <m:e>
-                                <m:r>
-                                  <a:rPr lang="en-US" sz="1000" b="0" i="1" smtClean="0">
-                                    <a:solidFill>
-                                      <a:schemeClr val="tx1">
-                                        <a:lumMod val="95000"/>
-                                        <a:lumOff val="5000"/>
-                                      </a:schemeClr>
-                                    </a:solidFill>
-                                    <a:latin typeface="Cambria Math" panose="02040503050406030204" pitchFamily="18" charset="0"/>
-                                  </a:rPr>
-                                  <m:t>𝑋</m:t>
-                                </m:r>
-                                <m:r>
-                                  <a:rPr lang="en-US" sz="1000" b="0" i="1" smtClean="0">
-                                    <a:solidFill>
-                                      <a:schemeClr val="tx1">
-                                        <a:lumMod val="95000"/>
-                                        <a:lumOff val="5000"/>
-                                      </a:schemeClr>
-                                    </a:solidFill>
-                                    <a:latin typeface="Cambria Math" panose="02040503050406030204" pitchFamily="18" charset="0"/>
-                                  </a:rPr>
-                                  <m:t> </m:t>
-                                </m:r>
-                              </m:e>
-                              <m:e>
-                                <m:r>
-                                  <a:rPr lang="en-US" sz="1000" b="0" i="1" smtClean="0">
-                                    <a:solidFill>
-                                      <a:schemeClr val="tx1">
-                                        <a:lumMod val="95000"/>
-                                        <a:lumOff val="5000"/>
-                                      </a:schemeClr>
-                                    </a:solidFill>
-                                    <a:latin typeface="Cambria Math" panose="02040503050406030204" pitchFamily="18" charset="0"/>
-                                  </a:rPr>
-                                  <m:t>𝑌</m:t>
-                                </m:r>
-                              </m:e>
-                              <m:e>
-                                <m:r>
-                                  <a:rPr lang="en-US" sz="1000" b="0" i="1" smtClean="0">
-                                    <a:solidFill>
-                                      <a:schemeClr val="tx1">
-                                        <a:lumMod val="95000"/>
-                                        <a:lumOff val="5000"/>
-                                      </a:schemeClr>
-                                    </a:solidFill>
-                                    <a:latin typeface="Cambria Math" panose="02040503050406030204" pitchFamily="18" charset="0"/>
-                                  </a:rPr>
-                                  <m:t>𝑍</m:t>
-                                </m:r>
-                              </m:e>
-                            </m:eqArr>
-                          </m:e>
-                        </m:d>
+                        <m:r>
+                          <m:rPr>
+                            <m:nor/>
+                          </m:rPr>
+                          <a:rPr lang="en-US" sz="1000" b="1" i="0" smtClean="0">
+                            <a:solidFill>
+                              <a:schemeClr val="tx1">
+                                <a:lumMod val="95000"/>
+                                <a:lumOff val="5000"/>
+                              </a:schemeClr>
+                            </a:solidFill>
+                            <a:latin typeface="Cambria Math" panose="02040503050406030204" pitchFamily="18" charset="0"/>
+                          </a:rPr>
+                          <m:t>x</m:t>
+                        </m:r>
                       </m:oMath>
                     </m:oMathPara>
                   </a14:m>
-                  <a:endParaRPr lang="en-US" sz="1000" dirty="0">
+                  <a:endParaRPr lang="en-US" sz="1000" b="1" dirty="0">
                     <a:solidFill>
                       <a:schemeClr val="tx1">
                         <a:lumMod val="95000"/>
@@ -29972,8 +29830,8 @@
               </p:nvSpPr>
               <p:spPr>
                 <a:xfrm>
-                  <a:off x="379782" y="5148057"/>
-                  <a:ext cx="379112" cy="497316"/>
+                  <a:off x="432175" y="5109953"/>
+                  <a:ext cx="379112" cy="246221"/>
                 </a:xfrm>
                 <a:prstGeom prst="rect">
                   <a:avLst/>
@@ -30389,7 +30247,7 @@
               <p:spPr>
                 <a:xfrm>
                   <a:off x="1384927" y="6353333"/>
-                  <a:ext cx="301749" cy="253916"/>
+                  <a:ext cx="281424" cy="246221"/>
                 </a:xfrm>
                 <a:prstGeom prst="rect">
                   <a:avLst/>
@@ -30413,7 +30271,7 @@
                           <a:rPr lang="en-US" sz="1000" b="0" i="1" smtClean="0">
                             <a:latin typeface="Cambria Math" panose="02040503050406030204" pitchFamily="18" charset="0"/>
                           </a:rPr>
-                          <m:t>𝑍</m:t>
+                          <m:t>𝑧</m:t>
                         </m:r>
                       </m:oMath>
                     </m:oMathPara>
@@ -30438,7 +30296,7 @@
               <p:spPr>
                 <a:xfrm>
                   <a:off x="1384927" y="6353333"/>
-                  <a:ext cx="301749" cy="253916"/>
+                  <a:ext cx="281424" cy="246221"/>
                 </a:xfrm>
                 <a:prstGeom prst="rect">
                   <a:avLst/>
@@ -30863,8 +30721,8 @@
           </p:nvSpPr>
           <p:spPr>
             <a:xfrm rot="21077016">
-              <a:off x="847601" y="6175619"/>
-              <a:ext cx="673582" cy="200055"/>
+              <a:off x="754628" y="6175619"/>
+              <a:ext cx="859531" cy="200055"/>
             </a:xfrm>
             <a:prstGeom prst="rect">
               <a:avLst/>
@@ -30879,7 +30737,7 @@
             <a:p>
               <a:r>
                 <a:rPr lang="en-US" sz="700" i="1" dirty="0" smtClean="0"/>
-                <a:t>OPTICAL AXIS</a:t>
+                <a:t>OPTICAL AXIS (OA)</a:t>
               </a:r>
               <a:endParaRPr lang="en-US" sz="700" i="1" dirty="0"/>
             </a:p>
@@ -35601,10 +35459,10 @@
         </p:nvGrpSpPr>
         <p:grpSpPr>
           <a:xfrm>
-            <a:off x="190612" y="3833813"/>
-            <a:ext cx="4982128" cy="2075920"/>
-            <a:chOff x="190612" y="3833813"/>
-            <a:chExt cx="4982128" cy="2075920"/>
+            <a:off x="238242" y="3833813"/>
+            <a:ext cx="4934498" cy="2075920"/>
+            <a:chOff x="238242" y="3833813"/>
+            <a:chExt cx="4934498" cy="2075920"/>
           </a:xfrm>
         </p:grpSpPr>
         <p:sp>
@@ -37005,24 +36863,30 @@
                         <m:jc m:val="centerGroup"/>
                       </m:oMathParaPr>
                       <m:oMath xmlns:m="http://schemas.openxmlformats.org/officeDocument/2006/math">
-                        <m:r>
-                          <a:rPr lang="en-US" sz="900" i="1" dirty="0" smtClean="0">
-                            <a:effectLst/>
-                            <a:latin typeface="Cambria Math" panose="02040503050406030204" pitchFamily="18" charset="0"/>
-                            <a:ea typeface="Calibri"/>
-                            <a:cs typeface="Times New Roman"/>
-                          </a:rPr>
-                          <m:t>𝐸</m:t>
-                        </m:r>
-                        <m:r>
-                          <a:rPr lang="en-US" sz="900" b="0" i="1" dirty="0" smtClean="0">
-                            <a:effectLst/>
-                            <a:latin typeface="Cambria Math" panose="02040503050406030204" pitchFamily="18" charset="0"/>
-                            <a:ea typeface="Calibri"/>
-                            <a:cs typeface="Times New Roman"/>
-                          </a:rPr>
-                          <m:t>′</m:t>
-                        </m:r>
+                        <m:acc>
+                          <m:accPr>
+                            <m:chr m:val="́"/>
+                            <m:ctrlPr>
+                              <a:rPr lang="en-US" sz="900" b="0" i="1" dirty="0" smtClean="0">
+                                <a:effectLst/>
+                                <a:latin typeface="Cambria Math" panose="02040503050406030204" pitchFamily="18" charset="0"/>
+                                <a:ea typeface="Calibri"/>
+                                <a:cs typeface="Times New Roman"/>
+                              </a:rPr>
+                            </m:ctrlPr>
+                          </m:accPr>
+                          <m:e>
+                            <m:r>
+                              <a:rPr lang="en-US" sz="900" i="1" dirty="0" smtClean="0">
+                                <a:effectLst/>
+                                <a:latin typeface="Cambria Math" panose="02040503050406030204" pitchFamily="18" charset="0"/>
+                                <a:ea typeface="Calibri"/>
+                                <a:cs typeface="Times New Roman"/>
+                              </a:rPr>
+                              <m:t>𝐸</m:t>
+                            </m:r>
+                          </m:e>
+                        </m:acc>
                       </m:oMath>
                     </m:oMathPara>
                   </a14:m>
@@ -37241,18 +37105,24 @@
                         <m:jc m:val="centerGroup"/>
                       </m:oMathParaPr>
                       <m:oMath xmlns:m="http://schemas.openxmlformats.org/officeDocument/2006/math">
-                        <m:r>
-                          <a:rPr lang="en-US" sz="1100" b="0" i="1" smtClean="0">
-                            <a:latin typeface="Cambria Math" panose="02040503050406030204" pitchFamily="18" charset="0"/>
-                          </a:rPr>
-                          <m:t>𝜔</m:t>
-                        </m:r>
-                        <m:r>
-                          <a:rPr lang="en-US" sz="1100" b="0" i="1" smtClean="0">
-                            <a:latin typeface="Cambria Math" panose="02040503050406030204" pitchFamily="18" charset="0"/>
-                          </a:rPr>
-                          <m:t>′</m:t>
-                        </m:r>
+                        <m:acc>
+                          <m:accPr>
+                            <m:chr m:val="́"/>
+                            <m:ctrlPr>
+                              <a:rPr lang="en-US" sz="1100" b="0" i="1" smtClean="0">
+                                <a:latin typeface="Cambria Math" panose="02040503050406030204" pitchFamily="18" charset="0"/>
+                              </a:rPr>
+                            </m:ctrlPr>
+                          </m:accPr>
+                          <m:e>
+                            <m:r>
+                              <a:rPr lang="en-US" sz="1100" b="0" i="1" smtClean="0">
+                                <a:latin typeface="Cambria Math" panose="02040503050406030204" pitchFamily="18" charset="0"/>
+                              </a:rPr>
+                              <m:t>𝜔</m:t>
+                            </m:r>
+                          </m:e>
+                        </m:acc>
                       </m:oMath>
                     </m:oMathPara>
                   </a14:m>
@@ -37281,7 +37151,7 @@
                 <a:blipFill rotWithShape="0">
                   <a:blip r:embed="rId30"/>
                   <a:stretch>
-                    <a:fillRect r="-4444"/>
+                    <a:fillRect r="-13333"/>
                   </a:stretch>
                 </a:blipFill>
               </p:spPr>
@@ -37415,8 +37285,8 @@
               </p:nvSpPr>
               <p:spPr>
                 <a:xfrm rot="1522105">
-                  <a:off x="1081113" y="4252391"/>
-                  <a:ext cx="943977" cy="246221"/>
+                  <a:off x="1503084" y="4314310"/>
+                  <a:ext cx="300082" cy="246221"/>
                 </a:xfrm>
                 <a:prstGeom prst="rect">
                   <a:avLst/>
@@ -37436,129 +37306,19 @@
                         <m:jc m:val="centerGroup"/>
                       </m:oMathParaPr>
                       <m:oMath xmlns:m="http://schemas.openxmlformats.org/officeDocument/2006/math">
-                        <m:acc>
-                          <m:accPr>
-                            <m:chr m:val="⃗"/>
-                            <m:ctrlPr>
-                              <a:rPr lang="en-US" sz="1000" b="0" i="1" smtClean="0">
-                                <a:solidFill>
-                                  <a:srgbClr val="C00000"/>
-                                </a:solidFill>
-                                <a:latin typeface="Cambria Math" panose="02040503050406030204" pitchFamily="18" charset="0"/>
-                              </a:rPr>
-                            </m:ctrlPr>
-                          </m:accPr>
-                          <m:e>
-                            <m:r>
-                              <a:rPr lang="en-US" sz="1000" b="0" i="1" smtClean="0">
-                                <a:solidFill>
-                                  <a:srgbClr val="C00000"/>
-                                </a:solidFill>
-                                <a:latin typeface="Cambria Math" panose="02040503050406030204" pitchFamily="18" charset="0"/>
-                              </a:rPr>
-                              <m:t>𝛼</m:t>
-                            </m:r>
-                          </m:e>
-                        </m:acc>
                         <m:r>
-                          <a:rPr lang="en-US" sz="1000" b="0" i="1" smtClean="0">
+                          <a:rPr lang="en-US" sz="1000" b="1" i="1" smtClean="0">
                             <a:solidFill>
                               <a:srgbClr val="C00000"/>
                             </a:solidFill>
                             <a:latin typeface="Cambria Math" panose="02040503050406030204" pitchFamily="18" charset="0"/>
                           </a:rPr>
-                          <m:t>=</m:t>
+                          <m:t>𝜶</m:t>
                         </m:r>
-                        <m:sSup>
-                          <m:sSupPr>
-                            <m:ctrlPr>
-                              <a:rPr lang="en-US" sz="1000" b="0" i="1" smtClean="0">
-                                <a:solidFill>
-                                  <a:srgbClr val="C00000"/>
-                                </a:solidFill>
-                                <a:latin typeface="Cambria Math" panose="02040503050406030204" pitchFamily="18" charset="0"/>
-                              </a:rPr>
-                            </m:ctrlPr>
-                          </m:sSupPr>
-                          <m:e>
-                            <m:d>
-                              <m:dPr>
-                                <m:begChr m:val="["/>
-                                <m:endChr m:val="]"/>
-                                <m:ctrlPr>
-                                  <a:rPr lang="en-US" sz="1000" b="0" i="1" smtClean="0">
-                                    <a:solidFill>
-                                      <a:srgbClr val="C00000"/>
-                                    </a:solidFill>
-                                    <a:latin typeface="Cambria Math" panose="02040503050406030204" pitchFamily="18" charset="0"/>
-                                  </a:rPr>
-                                </m:ctrlPr>
-                              </m:dPr>
-                              <m:e>
-                                <m:r>
-                                  <a:rPr lang="en-US" sz="1000" b="0" i="1" smtClean="0">
-                                    <a:solidFill>
-                                      <a:srgbClr val="C00000"/>
-                                    </a:solidFill>
-                                    <a:latin typeface="Cambria Math" panose="02040503050406030204" pitchFamily="18" charset="0"/>
-                                  </a:rPr>
-                                  <m:t>𝛼</m:t>
-                                </m:r>
-                                <m:r>
-                                  <a:rPr lang="en-US" sz="1000" b="0" i="1" smtClean="0">
-                                    <a:solidFill>
-                                      <a:srgbClr val="C00000"/>
-                                    </a:solidFill>
-                                    <a:latin typeface="Cambria Math" panose="02040503050406030204" pitchFamily="18" charset="0"/>
-                                  </a:rPr>
-                                  <m:t>, </m:t>
-                                </m:r>
-                                <m:r>
-                                  <a:rPr lang="en-US" sz="1000" b="0" i="1" smtClean="0">
-                                    <a:solidFill>
-                                      <a:srgbClr val="C00000"/>
-                                    </a:solidFill>
-                                    <a:latin typeface="Cambria Math" panose="02040503050406030204" pitchFamily="18" charset="0"/>
-                                  </a:rPr>
-                                  <m:t>𝛽</m:t>
-                                </m:r>
-                                <m:r>
-                                  <a:rPr lang="en-US" sz="1000" b="0" i="1" smtClean="0">
-                                    <a:solidFill>
-                                      <a:srgbClr val="C00000"/>
-                                    </a:solidFill>
-                                    <a:latin typeface="Cambria Math" panose="02040503050406030204" pitchFamily="18" charset="0"/>
-                                  </a:rPr>
-                                  <m:t>,</m:t>
-                                </m:r>
-                                <m:r>
-                                  <a:rPr lang="en-US" sz="1000" b="0" i="1" smtClean="0">
-                                    <a:solidFill>
-                                      <a:srgbClr val="C00000"/>
-                                    </a:solidFill>
-                                    <a:latin typeface="Cambria Math" panose="02040503050406030204" pitchFamily="18" charset="0"/>
-                                  </a:rPr>
-                                  <m:t>𝛾</m:t>
-                                </m:r>
-                              </m:e>
-                            </m:d>
-                          </m:e>
-                          <m:sup>
-                            <m:r>
-                              <a:rPr lang="en-US" sz="1000" b="0" i="1" smtClean="0">
-                                <a:solidFill>
-                                  <a:srgbClr val="C00000"/>
-                                </a:solidFill>
-                                <a:latin typeface="Cambria Math" panose="02040503050406030204" pitchFamily="18" charset="0"/>
-                              </a:rPr>
-                              <m:t>𝑇</m:t>
-                            </m:r>
-                          </m:sup>
-                        </m:sSup>
                       </m:oMath>
                     </m:oMathPara>
                   </a14:m>
-                  <a:endParaRPr lang="en-US" sz="1000" dirty="0">
+                  <a:endParaRPr lang="en-US" sz="1000" b="1" dirty="0">
                     <a:solidFill>
                       <a:srgbClr val="C00000"/>
                     </a:solidFill>
@@ -37578,8 +37338,8 @@
               </p:nvSpPr>
               <p:spPr>
                 <a:xfrm rot="1522105">
-                  <a:off x="1081113" y="4252391"/>
-                  <a:ext cx="943977" cy="246221"/>
+                  <a:off x="1503084" y="4314310"/>
+                  <a:ext cx="300082" cy="246221"/>
                 </a:xfrm>
                 <a:prstGeom prst="rect">
                   <a:avLst/>
@@ -37616,8 +37376,8 @@
               </p:nvSpPr>
               <p:spPr>
                 <a:xfrm rot="1486279">
-                  <a:off x="3498055" y="5031845"/>
-                  <a:ext cx="1108958" cy="246221"/>
+                  <a:off x="3978700" y="5069949"/>
+                  <a:ext cx="300082" cy="246221"/>
                 </a:xfrm>
                 <a:prstGeom prst="rect">
                   <a:avLst/>
@@ -37649,168 +37409,24 @@
                         <m:jc m:val="centerGroup"/>
                       </m:oMathParaPr>
                       <m:oMath xmlns:m="http://schemas.openxmlformats.org/officeDocument/2006/math">
-                        <m:sSup>
-                          <m:sSupPr>
+                        <m:acc>
+                          <m:accPr>
+                            <m:chr m:val="́"/>
                             <m:ctrlPr>
-                              <a:rPr lang="en-US" sz="1000" b="0" i="1" smtClean="0">
+                              <a:rPr lang="en-US" sz="1000" b="1" i="1">
                                 <a:latin typeface="Cambria Math" panose="02040503050406030204" pitchFamily="18" charset="0"/>
                               </a:rPr>
                             </m:ctrlPr>
-                          </m:sSupPr>
+                          </m:accPr>
                           <m:e>
-                            <m:acc>
-                              <m:accPr>
-                                <m:chr m:val="⃗"/>
-                                <m:ctrlPr>
-                                  <a:rPr lang="en-US" sz="1000" i="1" smtClean="0">
-                                    <a:latin typeface="Cambria Math" panose="02040503050406030204" pitchFamily="18" charset="0"/>
-                                  </a:rPr>
-                                </m:ctrlPr>
-                              </m:accPr>
-                              <m:e>
-                                <m:r>
-                                  <a:rPr lang="en-US" sz="1000">
-                                    <a:latin typeface="Cambria Math" panose="02040503050406030204" pitchFamily="18" charset="0"/>
-                                  </a:rPr>
-                                  <m:t>𝛼</m:t>
-                                </m:r>
-                              </m:e>
-                            </m:acc>
-                          </m:e>
-                          <m:sup>
                             <m:r>
-                              <a:rPr lang="en-US" sz="1000" b="0" i="1" smtClean="0">
+                              <a:rPr lang="en-US" sz="1000" b="1">
                                 <a:latin typeface="Cambria Math" panose="02040503050406030204" pitchFamily="18" charset="0"/>
                               </a:rPr>
-                              <m:t>′</m:t>
+                              <m:t>𝜶</m:t>
                             </m:r>
-                          </m:sup>
-                        </m:sSup>
-                        <m:r>
-                          <a:rPr lang="en-US" sz="1000">
-                            <a:latin typeface="Cambria Math" panose="02040503050406030204" pitchFamily="18" charset="0"/>
-                          </a:rPr>
-                          <m:t>=</m:t>
-                        </m:r>
-                        <m:sSup>
-                          <m:sSupPr>
-                            <m:ctrlPr>
-                              <a:rPr lang="en-US" sz="1000" b="0" i="1" smtClean="0">
-                                <a:latin typeface="Cambria Math" panose="02040503050406030204" pitchFamily="18" charset="0"/>
-                              </a:rPr>
-                            </m:ctrlPr>
-                          </m:sSupPr>
-                          <m:e>
-                            <m:d>
-                              <m:dPr>
-                                <m:begChr m:val="["/>
-                                <m:endChr m:val="]"/>
-                                <m:ctrlPr>
-                                  <a:rPr lang="en-US" sz="1000" b="0" i="1" smtClean="0">
-                                    <a:latin typeface="Cambria Math" panose="02040503050406030204" pitchFamily="18" charset="0"/>
-                                  </a:rPr>
-                                </m:ctrlPr>
-                              </m:dPr>
-                              <m:e>
-                                <m:sSup>
-                                  <m:sSupPr>
-                                    <m:ctrlPr>
-                                      <a:rPr lang="en-US" sz="1000" i="1">
-                                        <a:latin typeface="Cambria Math" panose="02040503050406030204" pitchFamily="18" charset="0"/>
-                                      </a:rPr>
-                                    </m:ctrlPr>
-                                  </m:sSupPr>
-                                  <m:e>
-                                    <m:r>
-                                      <a:rPr lang="en-US" sz="1000">
-                                        <a:latin typeface="Cambria Math" panose="02040503050406030204" pitchFamily="18" charset="0"/>
-                                      </a:rPr>
-                                      <m:t>𝛼</m:t>
-                                    </m:r>
-                                  </m:e>
-                                  <m:sup>
-                                    <m:r>
-                                      <a:rPr lang="en-US" sz="1000" i="1">
-                                        <a:latin typeface="Cambria Math" panose="02040503050406030204" pitchFamily="18" charset="0"/>
-                                      </a:rPr>
-                                      <m:t>′</m:t>
-                                    </m:r>
-                                  </m:sup>
-                                </m:sSup>
-                                <m:r>
-                                  <a:rPr lang="en-US" sz="1000">
-                                    <a:latin typeface="Cambria Math" panose="02040503050406030204" pitchFamily="18" charset="0"/>
-                                  </a:rPr>
-                                  <m:t>, </m:t>
-                                </m:r>
-                                <m:sSup>
-                                  <m:sSupPr>
-                                    <m:ctrlPr>
-                                      <a:rPr lang="en-US" sz="1000" i="1">
-                                        <a:latin typeface="Cambria Math" panose="02040503050406030204" pitchFamily="18" charset="0"/>
-                                      </a:rPr>
-                                    </m:ctrlPr>
-                                  </m:sSupPr>
-                                  <m:e>
-                                    <m:r>
-                                      <a:rPr lang="en-US" sz="1000">
-                                        <a:latin typeface="Cambria Math" panose="02040503050406030204" pitchFamily="18" charset="0"/>
-                                      </a:rPr>
-                                      <m:t>𝛽</m:t>
-                                    </m:r>
-                                  </m:e>
-                                  <m:sup>
-                                    <m:r>
-                                      <a:rPr lang="en-US" sz="1000" i="1">
-                                        <a:latin typeface="Cambria Math" panose="02040503050406030204" pitchFamily="18" charset="0"/>
-                                      </a:rPr>
-                                      <m:t>′</m:t>
-                                    </m:r>
-                                  </m:sup>
-                                </m:sSup>
-                                <m:r>
-                                  <a:rPr lang="en-US" sz="1000">
-                                    <a:latin typeface="Cambria Math" panose="02040503050406030204" pitchFamily="18" charset="0"/>
-                                  </a:rPr>
-                                  <m:t>,</m:t>
-                                </m:r>
-                                <m:sSup>
-                                  <m:sSupPr>
-                                    <m:ctrlPr>
-                                      <a:rPr lang="en-US" sz="1000" i="1">
-                                        <a:latin typeface="Cambria Math" panose="02040503050406030204" pitchFamily="18" charset="0"/>
-                                      </a:rPr>
-                                    </m:ctrlPr>
-                                  </m:sSupPr>
-                                  <m:e>
-                                    <m:r>
-                                      <a:rPr lang="en-US" sz="1000">
-                                        <a:latin typeface="Cambria Math" panose="02040503050406030204" pitchFamily="18" charset="0"/>
-                                      </a:rPr>
-                                      <m:t>𝛾</m:t>
-                                    </m:r>
-                                  </m:e>
-                                  <m:sup>
-                                    <m:r>
-                                      <a:rPr lang="en-US" sz="1000" i="1">
-                                        <a:latin typeface="Cambria Math" panose="02040503050406030204" pitchFamily="18" charset="0"/>
-                                      </a:rPr>
-                                      <m:t>′</m:t>
-                                    </m:r>
-                                  </m:sup>
-                                </m:sSup>
-                              </m:e>
-                            </m:d>
                           </m:e>
-                          <m:sup>
-                            <m:r>
-                              <a:rPr lang="en-US" sz="1000" b="0" i="1" smtClean="0">
-                                <a:latin typeface="Cambria Math" panose="02040503050406030204" pitchFamily="18" charset="0"/>
-                              </a:rPr>
-                              <m:t>𝑇</m:t>
-                            </m:r>
-                          </m:sup>
-                        </m:sSup>
+                        </m:acc>
                       </m:oMath>
                     </m:oMathPara>
                   </a14:m>
@@ -37830,8 +37446,8 @@
               </p:nvSpPr>
               <p:spPr>
                 <a:xfrm rot="1486279">
-                  <a:off x="3498055" y="5031845"/>
-                  <a:ext cx="1108958" cy="246221"/>
+                  <a:off x="3978700" y="5069949"/>
+                  <a:ext cx="300082" cy="246221"/>
                 </a:xfrm>
                 <a:prstGeom prst="rect">
                   <a:avLst/>
@@ -37839,7 +37455,7 @@
                 <a:blipFill rotWithShape="0">
                   <a:blip r:embed="rId32"/>
                   <a:stretch>
-                    <a:fillRect/>
+                    <a:fillRect r="-4762"/>
                   </a:stretch>
                 </a:blipFill>
               </p:spPr>
@@ -37919,8 +37535,8 @@
               </p:nvSpPr>
               <p:spPr>
                 <a:xfrm>
-                  <a:off x="190612" y="3984013"/>
-                  <a:ext cx="379112" cy="497316"/>
+                  <a:off x="238242" y="3955435"/>
+                  <a:ext cx="379112" cy="246221"/>
                 </a:xfrm>
                 <a:prstGeom prst="rect">
                   <a:avLst/>
@@ -37940,98 +37556,25 @@
                         <m:jc m:val="centerGroup"/>
                       </m:oMathParaPr>
                       <m:oMath xmlns:m="http://schemas.openxmlformats.org/officeDocument/2006/math">
-                        <m:d>
-                          <m:dPr>
-                            <m:begChr m:val="["/>
-                            <m:endChr m:val="]"/>
-                            <m:ctrlPr>
-                              <a:rPr lang="en-US" sz="1000" b="0" i="1" smtClean="0">
-                                <a:solidFill>
-                                  <a:schemeClr val="tx1">
-                                    <a:lumMod val="95000"/>
-                                    <a:lumOff val="5000"/>
-                                  </a:schemeClr>
-                                </a:solidFill>
-                                <a:latin typeface="Cambria Math" panose="02040503050406030204" pitchFamily="18" charset="0"/>
-                              </a:rPr>
-                            </m:ctrlPr>
-                          </m:dPr>
-                          <m:e>
-                            <m:eqArr>
-                              <m:eqArrPr>
-                                <m:ctrlPr>
-                                  <a:rPr lang="en-US" sz="1000" b="0" i="1" smtClean="0">
-                                    <a:solidFill>
-                                      <a:schemeClr val="tx1">
-                                        <a:lumMod val="95000"/>
-                                        <a:lumOff val="5000"/>
-                                      </a:schemeClr>
-                                    </a:solidFill>
-                                    <a:latin typeface="Cambria Math" panose="02040503050406030204" pitchFamily="18" charset="0"/>
-                                  </a:rPr>
-                                </m:ctrlPr>
-                              </m:eqArrPr>
-                              <m:e>
-                                <m:r>
-                                  <a:rPr lang="en-US" sz="1000" b="0" i="1" smtClean="0">
-                                    <a:solidFill>
-                                      <a:schemeClr val="tx1">
-                                        <a:lumMod val="95000"/>
-                                        <a:lumOff val="5000"/>
-                                      </a:schemeClr>
-                                    </a:solidFill>
-                                    <a:latin typeface="Cambria Math" panose="02040503050406030204" pitchFamily="18" charset="0"/>
-                                  </a:rPr>
-                                  <m:t>𝑋</m:t>
-                                </m:r>
-                                <m:r>
-                                  <a:rPr lang="en-US" sz="1000" b="0" i="1" smtClean="0">
-                                    <a:solidFill>
-                                      <a:schemeClr val="tx1">
-                                        <a:lumMod val="95000"/>
-                                        <a:lumOff val="5000"/>
-                                      </a:schemeClr>
-                                    </a:solidFill>
-                                    <a:latin typeface="Cambria Math" panose="02040503050406030204" pitchFamily="18" charset="0"/>
-                                  </a:rPr>
-                                  <m:t> </m:t>
-                                </m:r>
-                              </m:e>
-                              <m:e>
-                                <m:r>
-                                  <a:rPr lang="en-US" sz="1000" b="0" i="1" smtClean="0">
-                                    <a:solidFill>
-                                      <a:schemeClr val="tx1">
-                                        <a:lumMod val="95000"/>
-                                        <a:lumOff val="5000"/>
-                                      </a:schemeClr>
-                                    </a:solidFill>
-                                    <a:latin typeface="Cambria Math" panose="02040503050406030204" pitchFamily="18" charset="0"/>
-                                  </a:rPr>
-                                  <m:t>𝑌</m:t>
-                                </m:r>
-                              </m:e>
-                              <m:e>
-                                <m:r>
-                                  <a:rPr lang="en-US" sz="1000" b="0" i="1" smtClean="0">
-                                    <a:solidFill>
-                                      <a:schemeClr val="tx1">
-                                        <a:lumMod val="95000"/>
-                                        <a:lumOff val="5000"/>
-                                      </a:schemeClr>
-                                    </a:solidFill>
-                                    <a:latin typeface="Cambria Math" panose="02040503050406030204" pitchFamily="18" charset="0"/>
-                                  </a:rPr>
-                                  <m:t>𝑍</m:t>
-                                </m:r>
-                              </m:e>
-                            </m:eqArr>
-                          </m:e>
-                        </m:d>
+                        <m:r>
+                          <m:rPr>
+                            <m:nor/>
+                          </m:rPr>
+                          <a:rPr lang="en-US" sz="1000" b="1" i="0" smtClean="0">
+                            <a:solidFill>
+                              <a:schemeClr val="tx1">
+                                <a:lumMod val="95000"/>
+                                <a:lumOff val="5000"/>
+                              </a:schemeClr>
+                            </a:solidFill>
+                            <a:latin typeface="Cambria Math" panose="02040503050406030204" pitchFamily="18" charset="0"/>
+                          </a:rPr>
+                          <m:t>x</m:t>
+                        </m:r>
                       </m:oMath>
                     </m:oMathPara>
                   </a14:m>
-                  <a:endParaRPr lang="en-US" sz="1000" dirty="0">
+                  <a:endParaRPr lang="en-US" sz="1000" b="1" dirty="0">
                     <a:solidFill>
                       <a:schemeClr val="tx1">
                         <a:lumMod val="95000"/>
@@ -38054,8 +37597,8 @@
               </p:nvSpPr>
               <p:spPr>
                 <a:xfrm>
-                  <a:off x="190612" y="3984013"/>
-                  <a:ext cx="379112" cy="497316"/>
+                  <a:off x="238242" y="3955435"/>
+                  <a:ext cx="379112" cy="246221"/>
                 </a:xfrm>
                 <a:prstGeom prst="rect">
                   <a:avLst/>
@@ -38614,7 +38157,7 @@
               <p:spPr>
                 <a:xfrm>
                   <a:off x="1195757" y="5189289"/>
-                  <a:ext cx="301749" cy="253916"/>
+                  <a:ext cx="281424" cy="246221"/>
                 </a:xfrm>
                 <a:prstGeom prst="rect">
                   <a:avLst/>
@@ -38638,7 +38181,7 @@
                           <a:rPr lang="en-US" sz="1000" b="0" i="1" smtClean="0">
                             <a:latin typeface="Cambria Math" panose="02040503050406030204" pitchFamily="18" charset="0"/>
                           </a:rPr>
-                          <m:t>𝑍</m:t>
+                          <m:t>𝑧</m:t>
                         </m:r>
                       </m:oMath>
                     </m:oMathPara>
@@ -38663,7 +38206,7 @@
               <p:spPr>
                 <a:xfrm>
                   <a:off x="1195757" y="5189289"/>
-                  <a:ext cx="301749" cy="253916"/>
+                  <a:ext cx="281424" cy="246221"/>
                 </a:xfrm>
                 <a:prstGeom prst="rect">
                   <a:avLst/>
@@ -38701,7 +38244,7 @@
               <p:spPr>
                 <a:xfrm>
                   <a:off x="3722656" y="5451462"/>
-                  <a:ext cx="333168" cy="246221"/>
+                  <a:ext cx="278217" cy="246221"/>
                 </a:xfrm>
                 <a:prstGeom prst="rect">
                   <a:avLst/>
@@ -38721,39 +38264,24 @@
                         <m:jc m:val="centerGroup"/>
                       </m:oMathParaPr>
                       <m:oMath xmlns:m="http://schemas.openxmlformats.org/officeDocument/2006/math">
-                        <m:sSubSup>
-                          <m:sSubSupPr>
+                        <m:acc>
+                          <m:accPr>
+                            <m:chr m:val="́"/>
                             <m:ctrlPr>
                               <a:rPr lang="en-US" sz="1000" b="0" i="1" smtClean="0">
                                 <a:latin typeface="Cambria Math" panose="02040503050406030204" pitchFamily="18" charset="0"/>
                               </a:rPr>
                             </m:ctrlPr>
-                          </m:sSubSupPr>
+                          </m:accPr>
                           <m:e>
                             <m:r>
                               <a:rPr lang="en-US" sz="1000" b="0" i="1" smtClean="0">
                                 <a:latin typeface="Cambria Math" panose="02040503050406030204" pitchFamily="18" charset="0"/>
                               </a:rPr>
-                              <m:t>𝑍</m:t>
+                              <m:t>𝑧</m:t>
                             </m:r>
                           </m:e>
-                          <m:sub>
-                            <m:r>
-                              <a:rPr lang="en-US" sz="1000" b="0" i="1" smtClean="0">
-                                <a:latin typeface="Cambria Math" panose="02040503050406030204" pitchFamily="18" charset="0"/>
-                              </a:rPr>
-                              <m:t> </m:t>
-                            </m:r>
-                          </m:sub>
-                          <m:sup>
-                            <m:r>
-                              <a:rPr lang="en-US" sz="1000" b="0" i="1" smtClean="0">
-                                <a:latin typeface="Cambria Math" panose="02040503050406030204" pitchFamily="18" charset="0"/>
-                              </a:rPr>
-                              <m:t>′</m:t>
-                            </m:r>
-                          </m:sup>
-                        </m:sSubSup>
+                        </m:acc>
                       </m:oMath>
                     </m:oMathPara>
                   </a14:m>
@@ -38774,7 +38302,7 @@
               <p:spPr>
                 <a:xfrm>
                   <a:off x="3722656" y="5451462"/>
-                  <a:ext cx="333168" cy="246221"/>
+                  <a:ext cx="278217" cy="246221"/>
                 </a:xfrm>
                 <a:prstGeom prst="rect">
                   <a:avLst/>
@@ -38782,7 +38310,7 @@
                 <a:blipFill rotWithShape="0">
                   <a:blip r:embed="rId36"/>
                   <a:stretch>
-                    <a:fillRect/>
+                    <a:fillRect r="-15556"/>
                   </a:stretch>
                 </a:blipFill>
               </p:spPr>
@@ -39296,8 +38824,8 @@
           </p:nvSpPr>
           <p:spPr>
             <a:xfrm rot="21077016">
-              <a:off x="658431" y="5011575"/>
-              <a:ext cx="673582" cy="200055"/>
+              <a:off x="565458" y="5011575"/>
+              <a:ext cx="859531" cy="200055"/>
             </a:xfrm>
             <a:prstGeom prst="rect">
               <a:avLst/>
@@ -39312,7 +38840,7 @@
             <a:p>
               <a:r>
                 <a:rPr lang="en-US" sz="700" i="1" dirty="0" smtClean="0"/>
-                <a:t>OPTICAL AXIS</a:t>
+                <a:t>OPTICAL AXIS (OA)</a:t>
               </a:r>
               <a:endParaRPr lang="en-US" sz="700" i="1" dirty="0"/>
             </a:p>
@@ -39368,8 +38896,8 @@
               </p:nvSpPr>
               <p:spPr>
                 <a:xfrm>
-                  <a:off x="4642700" y="5196956"/>
-                  <a:ext cx="417250" cy="510011"/>
+                  <a:off x="4490299" y="5158854"/>
+                  <a:ext cx="417250" cy="246221"/>
                 </a:xfrm>
                 <a:prstGeom prst="rect">
                   <a:avLst/>
@@ -39389,10 +38917,9 @@
                         <m:jc m:val="centerGroup"/>
                       </m:oMathParaPr>
                       <m:oMath xmlns:m="http://schemas.openxmlformats.org/officeDocument/2006/math">
-                        <m:d>
-                          <m:dPr>
-                            <m:begChr m:val="["/>
-                            <m:endChr m:val="]"/>
+                        <m:acc>
+                          <m:accPr>
+                            <m:chr m:val="́"/>
                             <m:ctrlPr>
                               <a:rPr lang="en-US" sz="1000" b="0" i="1" smtClean="0">
                                 <a:solidFill>
@@ -39404,103 +38931,25 @@
                                 <a:latin typeface="Cambria Math" panose="02040503050406030204" pitchFamily="18" charset="0"/>
                               </a:rPr>
                             </m:ctrlPr>
-                          </m:dPr>
+                          </m:accPr>
                           <m:e>
-                            <m:eqArr>
-                              <m:eqArrPr>
-                                <m:ctrlPr>
-                                  <a:rPr lang="en-US" sz="1000" b="0" i="1" smtClean="0">
-                                    <a:solidFill>
-                                      <a:schemeClr val="tx1">
-                                        <a:lumMod val="95000"/>
-                                        <a:lumOff val="5000"/>
-                                      </a:schemeClr>
-                                    </a:solidFill>
-                                    <a:latin typeface="Cambria Math" panose="02040503050406030204" pitchFamily="18" charset="0"/>
-                                  </a:rPr>
-                                </m:ctrlPr>
-                              </m:eqArrPr>
-                              <m:e>
-                                <m:r>
-                                  <a:rPr lang="en-US" sz="1000" b="0" i="1" smtClean="0">
-                                    <a:solidFill>
-                                      <a:schemeClr val="tx1">
-                                        <a:lumMod val="95000"/>
-                                        <a:lumOff val="5000"/>
-                                      </a:schemeClr>
-                                    </a:solidFill>
-                                    <a:latin typeface="Cambria Math" panose="02040503050406030204" pitchFamily="18" charset="0"/>
-                                  </a:rPr>
-                                  <m:t>𝑋</m:t>
-                                </m:r>
-                                <m:r>
-                                  <a:rPr lang="en-US" sz="1000" b="0" i="1" smtClean="0">
-                                    <a:solidFill>
-                                      <a:schemeClr val="tx1">
-                                        <a:lumMod val="95000"/>
-                                        <a:lumOff val="5000"/>
-                                      </a:schemeClr>
-                                    </a:solidFill>
-                                    <a:latin typeface="Cambria Math" panose="02040503050406030204" pitchFamily="18" charset="0"/>
-                                  </a:rPr>
-                                  <m:t>′ </m:t>
-                                </m:r>
-                              </m:e>
-                              <m:e>
-                                <m:r>
-                                  <a:rPr lang="en-US" sz="1000" b="0" i="1" smtClean="0">
-                                    <a:solidFill>
-                                      <a:schemeClr val="tx1">
-                                        <a:lumMod val="95000"/>
-                                        <a:lumOff val="5000"/>
-                                      </a:schemeClr>
-                                    </a:solidFill>
-                                    <a:latin typeface="Cambria Math" panose="02040503050406030204" pitchFamily="18" charset="0"/>
-                                  </a:rPr>
-                                  <m:t>𝑌</m:t>
-                                </m:r>
-                                <m:r>
-                                  <a:rPr lang="en-US" sz="1000" b="0" i="1" smtClean="0">
-                                    <a:solidFill>
-                                      <a:schemeClr val="tx1">
-                                        <a:lumMod val="95000"/>
-                                        <a:lumOff val="5000"/>
-                                      </a:schemeClr>
-                                    </a:solidFill>
-                                    <a:latin typeface="Cambria Math" panose="02040503050406030204" pitchFamily="18" charset="0"/>
-                                  </a:rPr>
-                                  <m:t>′</m:t>
-                                </m:r>
-                              </m:e>
-                              <m:e>
-                                <m:r>
-                                  <a:rPr lang="en-US" sz="1000" b="0" i="1" smtClean="0">
-                                    <a:solidFill>
-                                      <a:schemeClr val="tx1">
-                                        <a:lumMod val="95000"/>
-                                        <a:lumOff val="5000"/>
-                                      </a:schemeClr>
-                                    </a:solidFill>
-                                    <a:latin typeface="Cambria Math" panose="02040503050406030204" pitchFamily="18" charset="0"/>
-                                  </a:rPr>
-                                  <m:t>𝑍</m:t>
-                                </m:r>
-                                <m:r>
-                                  <a:rPr lang="en-US" sz="1000" b="0" i="1" smtClean="0">
-                                    <a:solidFill>
-                                      <a:schemeClr val="tx1">
-                                        <a:lumMod val="95000"/>
-                                        <a:lumOff val="5000"/>
-                                      </a:schemeClr>
-                                    </a:solidFill>
-                                    <a:latin typeface="Cambria Math" panose="02040503050406030204" pitchFamily="18" charset="0"/>
-                                  </a:rPr>
-                                  <m:t>′</m:t>
-                                </m:r>
-                              </m:e>
-                            </m:eqArr>
+                            <m:r>
+                              <m:rPr>
+                                <m:nor/>
+                              </m:rPr>
+                              <a:rPr lang="en-US" sz="1000" b="1" i="0" smtClean="0">
+                                <a:solidFill>
+                                  <a:schemeClr val="tx1">
+                                    <a:lumMod val="95000"/>
+                                    <a:lumOff val="5000"/>
+                                  </a:schemeClr>
+                                </a:solidFill>
+                                <a:latin typeface="Cambria Math" panose="02040503050406030204" pitchFamily="18" charset="0"/>
+                              </a:rPr>
+                              <m:t>x</m:t>
+                            </m:r>
                           </m:e>
-                        </m:d>
+                        </m:acc>
                       </m:oMath>
                     </m:oMathPara>
                   </a14:m>
@@ -39527,8 +38976,8 @@
               </p:nvSpPr>
               <p:spPr>
                 <a:xfrm>
-                  <a:off x="4642700" y="5196956"/>
-                  <a:ext cx="417250" cy="510011"/>
+                  <a:off x="4490299" y="5158854"/>
+                  <a:ext cx="417250" cy="246221"/>
                 </a:xfrm>
                 <a:prstGeom prst="rect">
                   <a:avLst/>
@@ -39606,7 +39055,7 @@
               <p:spPr>
                 <a:xfrm>
                   <a:off x="4688032" y="4963322"/>
-                  <a:ext cx="301878" cy="215444"/>
+                  <a:ext cx="305275" cy="215444"/>
                 </a:xfrm>
                 <a:prstGeom prst="rect">
                   <a:avLst/>
@@ -39652,13 +39101,13 @@
                               </m:accPr>
                               <m:e>
                                 <m:r>
-                                  <a:rPr lang="en-US" sz="800" b="0" i="1" smtClean="0">
+                                  <a:rPr lang="en-US" sz="800" b="1" i="1" smtClean="0">
                                     <a:solidFill>
                                       <a:schemeClr val="tx1"/>
                                     </a:solidFill>
                                     <a:latin typeface="Cambria Math" panose="02040503050406030204" pitchFamily="18" charset="0"/>
                                   </a:rPr>
-                                  <m:t>𝑛</m:t>
+                                  <m:t>𝒏</m:t>
                                 </m:r>
                               </m:e>
                             </m:acc>
@@ -39699,7 +39148,7 @@
               <p:spPr>
                 <a:xfrm>
                   <a:off x="4688032" y="4963322"/>
-                  <a:ext cx="301878" cy="215444"/>
+                  <a:ext cx="305275" cy="215444"/>
                 </a:xfrm>
                 <a:prstGeom prst="rect">
                   <a:avLst/>
@@ -40539,8 +39988,8 @@
               </p:nvSpPr>
               <p:spPr>
                 <a:xfrm rot="21060000">
-                  <a:off x="3061555" y="4916911"/>
-                  <a:ext cx="349904" cy="246221"/>
+                  <a:off x="3061558" y="4912679"/>
+                  <a:ext cx="349903" cy="254685"/>
                 </a:xfrm>
                 <a:prstGeom prst="rect">
                   <a:avLst/>
@@ -40569,12 +40018,24 @@
                             </m:ctrlPr>
                           </m:sSubSupPr>
                           <m:e>
-                            <m:r>
-                              <a:rPr lang="en-US" sz="1000" b="0" i="1" smtClean="0">
-                                <a:latin typeface="Cambria Math" panose="02040503050406030204" pitchFamily="18" charset="0"/>
-                              </a:rPr>
-                              <m:t>𝑑</m:t>
-                            </m:r>
+                            <m:acc>
+                              <m:accPr>
+                                <m:chr m:val="́"/>
+                                <m:ctrlPr>
+                                  <a:rPr lang="en-US" sz="1000" b="0" i="1" smtClean="0">
+                                    <a:latin typeface="Cambria Math" panose="02040503050406030204" pitchFamily="18" charset="0"/>
+                                  </a:rPr>
+                                </m:ctrlPr>
+                              </m:accPr>
+                              <m:e>
+                                <m:r>
+                                  <a:rPr lang="en-US" sz="1000" b="0" i="1" smtClean="0">
+                                    <a:latin typeface="Cambria Math" panose="02040503050406030204" pitchFamily="18" charset="0"/>
+                                  </a:rPr>
+                                  <m:t>𝑑</m:t>
+                                </m:r>
+                              </m:e>
+                            </m:acc>
                           </m:e>
                           <m:sub>
                             <m:r>
@@ -40589,7 +40050,7 @@
                               <a:rPr lang="en-US" sz="1000" b="0" i="1" smtClean="0">
                                 <a:latin typeface="Cambria Math" panose="02040503050406030204" pitchFamily="18" charset="0"/>
                               </a:rPr>
-                              <m:t>′</m:t>
+                              <m:t> </m:t>
                             </m:r>
                           </m:sup>
                         </m:sSubSup>
@@ -40615,8 +40076,8 @@
               </p:nvSpPr>
               <p:spPr>
                 <a:xfrm rot="21060000">
-                  <a:off x="3061555" y="4916911"/>
-                  <a:ext cx="349904" cy="246221"/>
+                  <a:off x="3061558" y="4912679"/>
+                  <a:ext cx="349903" cy="254685"/>
                 </a:xfrm>
                 <a:prstGeom prst="rect">
                   <a:avLst/>
@@ -40735,8 +40196,8 @@
             </p:style>
           </p:cxnSp>
         </p:grpSp>
-        <mc:AlternateContent xmlns:mc="http://schemas.openxmlformats.org/markup-compatibility/2006">
-          <mc:Choice xmlns:a14="http://schemas.microsoft.com/office/drawing/2010/main" Requires="a14">
+        <mc:AlternateContent xmlns:mc="http://schemas.openxmlformats.org/markup-compatibility/2006" xmlns:a14="http://schemas.microsoft.com/office/drawing/2010/main">
+          <mc:Choice Requires="a14">
             <p:sp>
               <p:nvSpPr>
                 <p:cNvPr id="172" name="TextBox 171"/>
@@ -40746,7 +40207,7 @@
               <p:spPr>
                 <a:xfrm>
                   <a:off x="3718418" y="5616561"/>
-                  <a:ext cx="346953" cy="246221"/>
+                  <a:ext cx="334772" cy="246221"/>
                 </a:xfrm>
                 <a:prstGeom prst="rect">
                   <a:avLst/>
@@ -40775,12 +40236,24 @@
                             </m:ctrlPr>
                           </m:sSubSupPr>
                           <m:e>
-                            <m:r>
-                              <a:rPr lang="en-US" sz="1000" b="0" i="1" smtClean="0">
-                                <a:latin typeface="Cambria Math" panose="02040503050406030204" pitchFamily="18" charset="0"/>
-                              </a:rPr>
-                              <m:t>𝑍</m:t>
-                            </m:r>
+                            <m:acc>
+                              <m:accPr>
+                                <m:chr m:val="́"/>
+                                <m:ctrlPr>
+                                  <a:rPr lang="en-US" sz="1000" b="0" i="1" smtClean="0">
+                                    <a:latin typeface="Cambria Math" panose="02040503050406030204" pitchFamily="18" charset="0"/>
+                                  </a:rPr>
+                                </m:ctrlPr>
+                              </m:accPr>
+                              <m:e>
+                                <m:r>
+                                  <a:rPr lang="en-US" sz="1000" b="0" i="1" smtClean="0">
+                                    <a:latin typeface="Cambria Math" panose="02040503050406030204" pitchFamily="18" charset="0"/>
+                                  </a:rPr>
+                                  <m:t>𝑧</m:t>
+                                </m:r>
+                              </m:e>
+                            </m:acc>
                           </m:e>
                           <m:sub>
                             <m:r>
@@ -40795,7 +40268,7 @@
                               <a:rPr lang="en-US" sz="1000" b="0" i="1" smtClean="0">
                                 <a:latin typeface="Cambria Math" panose="02040503050406030204" pitchFamily="18" charset="0"/>
                               </a:rPr>
-                              <m:t>′</m:t>
+                              <m:t> </m:t>
                             </m:r>
                           </m:sup>
                         </m:sSubSup>
@@ -40807,7 +40280,7 @@
               </p:txBody>
             </p:sp>
           </mc:Choice>
-          <mc:Fallback>
+          <mc:Fallback xmlns="">
             <p:sp>
               <p:nvSpPr>
                 <p:cNvPr id="172" name="TextBox 171"/>
@@ -40819,7 +40292,7 @@
               <p:spPr>
                 <a:xfrm>
                   <a:off x="3718418" y="5616561"/>
-                  <a:ext cx="346953" cy="246221"/>
+                  <a:ext cx="334772" cy="246221"/>
                 </a:xfrm>
                 <a:prstGeom prst="rect">
                   <a:avLst/>
@@ -40827,7 +40300,7 @@
                 <a:blipFill rotWithShape="0">
                   <a:blip r:embed="rId45"/>
                   <a:stretch>
-                    <a:fillRect/>
+                    <a:fillRect r="-1818"/>
                   </a:stretch>
                 </a:blipFill>
               </p:spPr>
@@ -41436,7 +40909,7 @@
               <p:spPr>
                 <a:xfrm>
                   <a:off x="4747771" y="2822639"/>
-                  <a:ext cx="301878" cy="215444"/>
+                  <a:ext cx="305275" cy="215444"/>
                 </a:xfrm>
                 <a:prstGeom prst="rect">
                   <a:avLst/>
@@ -41482,13 +40955,13 @@
                               </m:accPr>
                               <m:e>
                                 <m:r>
-                                  <a:rPr lang="en-US" sz="800" b="0" i="1" smtClean="0">
+                                  <a:rPr lang="en-US" sz="800" b="1" i="1" smtClean="0">
                                     <a:solidFill>
                                       <a:schemeClr val="tx1"/>
                                     </a:solidFill>
                                     <a:latin typeface="Cambria Math" panose="02040503050406030204" pitchFamily="18" charset="0"/>
                                   </a:rPr>
-                                  <m:t>𝑛</m:t>
+                                  <m:t>𝒏</m:t>
                                 </m:r>
                               </m:e>
                             </m:acc>
@@ -41529,7 +41002,7 @@
               <p:spPr>
                 <a:xfrm>
                   <a:off x="4747771" y="2822639"/>
-                  <a:ext cx="301878" cy="215444"/>
+                  <a:ext cx="305275" cy="215444"/>
                 </a:xfrm>
                 <a:prstGeom prst="rect">
                   <a:avLst/>
@@ -41686,8 +41159,8 @@
             </p:style>
           </p:cxnSp>
         </p:grpSp>
-        <mc:AlternateContent xmlns:mc="http://schemas.openxmlformats.org/markup-compatibility/2006">
-          <mc:Choice xmlns:a14="http://schemas.microsoft.com/office/drawing/2010/main" Requires="a14">
+        <mc:AlternateContent xmlns:mc="http://schemas.openxmlformats.org/markup-compatibility/2006" xmlns:a14="http://schemas.microsoft.com/office/drawing/2010/main">
+          <mc:Choice Requires="a14">
             <p:sp>
               <p:nvSpPr>
                 <p:cNvPr id="80" name="TextBox 79"/>
@@ -41720,22 +41193,34 @@
                         <m:sSubSup>
                           <m:sSubSupPr>
                             <m:ctrlPr>
-                              <a:rPr lang="en-US" sz="1000" b="0" i="1" smtClean="0">
+                              <a:rPr lang="en-US" sz="1000" i="1">
                                 <a:latin typeface="Cambria Math" panose="02040503050406030204" pitchFamily="18" charset="0"/>
                               </a:rPr>
                             </m:ctrlPr>
                           </m:sSubSupPr>
                           <m:e>
-                            <m:r>
-                              <a:rPr lang="en-US" sz="1000" b="0" i="1" smtClean="0">
-                                <a:latin typeface="Cambria Math" panose="02040503050406030204" pitchFamily="18" charset="0"/>
-                              </a:rPr>
-                              <m:t>𝑍</m:t>
-                            </m:r>
+                            <m:acc>
+                              <m:accPr>
+                                <m:chr m:val="́"/>
+                                <m:ctrlPr>
+                                  <a:rPr lang="en-US" sz="1000" i="1">
+                                    <a:latin typeface="Cambria Math" panose="02040503050406030204" pitchFamily="18" charset="0"/>
+                                  </a:rPr>
+                                </m:ctrlPr>
+                              </m:accPr>
+                              <m:e>
+                                <m:r>
+                                  <a:rPr lang="en-US" sz="1000" i="1">
+                                    <a:latin typeface="Cambria Math" panose="02040503050406030204" pitchFamily="18" charset="0"/>
+                                  </a:rPr>
+                                  <m:t>𝑧</m:t>
+                                </m:r>
+                              </m:e>
+                            </m:acc>
                           </m:e>
                           <m:sub>
                             <m:r>
-                              <a:rPr lang="en-US" sz="1000" b="0" i="1" smtClean="0">
+                              <a:rPr lang="en-US" sz="1000" i="1">
                                 <a:latin typeface="Cambria Math" panose="02040503050406030204" pitchFamily="18" charset="0"/>
                               </a:rPr>
                               <m:t>𝑜</m:t>
@@ -41743,10 +41228,10 @@
                           </m:sub>
                           <m:sup>
                             <m:r>
-                              <a:rPr lang="en-US" sz="1000" b="0" i="1" smtClean="0">
+                              <a:rPr lang="en-US" sz="1000" i="1">
                                 <a:latin typeface="Cambria Math" panose="02040503050406030204" pitchFamily="18" charset="0"/>
                               </a:rPr>
-                              <m:t>′</m:t>
+                              <m:t> </m:t>
                             </m:r>
                           </m:sup>
                         </m:sSubSup>
@@ -41758,7 +41243,7 @@
               </p:txBody>
             </p:sp>
           </mc:Choice>
-          <mc:Fallback>
+          <mc:Fallback xmlns="">
             <p:sp>
               <p:nvSpPr>
                 <p:cNvPr id="80" name="TextBox 79"/>
@@ -41805,7 +41290,7 @@
           </p:nvSpPr>
           <p:spPr>
             <a:xfrm rot="16851975">
-              <a:off x="4549841" y="2284884"/>
+              <a:off x="4559367" y="2232491"/>
               <a:ext cx="692818" cy="200055"/>
             </a:xfrm>
             <a:prstGeom prst="rect">
@@ -42163,8 +41648,8 @@
             </a:fontRef>
           </p:style>
         </p:cxnSp>
-        <mc:AlternateContent xmlns:mc="http://schemas.openxmlformats.org/markup-compatibility/2006">
-          <mc:Choice xmlns:a14="http://schemas.microsoft.com/office/drawing/2010/main" Requires="a14">
+        <mc:AlternateContent xmlns:mc="http://schemas.openxmlformats.org/markup-compatibility/2006" xmlns:a14="http://schemas.microsoft.com/office/drawing/2010/main">
+          <mc:Choice Requires="a14">
             <p:sp>
               <p:nvSpPr>
                 <p:cNvPr id="104" name="TextBox 103"/>
@@ -42173,8 +41658,8 @@
               </p:nvSpPr>
               <p:spPr>
                 <a:xfrm rot="691448">
-                  <a:off x="3545135" y="2890729"/>
-                  <a:ext cx="412677" cy="246221"/>
+                  <a:off x="3551227" y="2890729"/>
+                  <a:ext cx="400494" cy="246221"/>
                 </a:xfrm>
                 <a:prstGeom prst="rect">
                   <a:avLst/>
@@ -42204,12 +41689,24 @@
                             </m:ctrlPr>
                           </m:sSubSupPr>
                           <m:e>
-                            <m:r>
-                              <a:rPr lang="en-US" sz="1000" b="0" i="1" smtClean="0">
-                                <a:latin typeface="Cambria Math" panose="02040503050406030204" pitchFamily="18" charset="0"/>
-                              </a:rPr>
-                              <m:t>𝑍</m:t>
-                            </m:r>
+                            <m:acc>
+                              <m:accPr>
+                                <m:chr m:val="́"/>
+                                <m:ctrlPr>
+                                  <a:rPr lang="en-US" sz="1000" b="0" i="1" smtClean="0">
+                                    <a:latin typeface="Cambria Math" panose="02040503050406030204" pitchFamily="18" charset="0"/>
+                                  </a:rPr>
+                                </m:ctrlPr>
+                              </m:accPr>
+                              <m:e>
+                                <m:r>
+                                  <a:rPr lang="en-US" sz="1000" b="0" i="1" smtClean="0">
+                                    <a:latin typeface="Cambria Math" panose="02040503050406030204" pitchFamily="18" charset="0"/>
+                                  </a:rPr>
+                                  <m:t>𝑧</m:t>
+                                </m:r>
+                              </m:e>
+                            </m:acc>
                           </m:e>
                           <m:sub>
                             <m:r>
@@ -42232,7 +41729,7 @@
                                 <a:latin typeface="Cambria Math" panose="02040503050406030204" pitchFamily="18" charset="0"/>
                                 <a:ea typeface="Cambria Math" panose="02040503050406030204" pitchFamily="18" charset="0"/>
                               </a:rPr>
-                              <m:t>′</m:t>
+                              <m:t> </m:t>
                             </m:r>
                           </m:sup>
                         </m:sSubSup>
@@ -42244,7 +41741,7 @@
               </p:txBody>
             </p:sp>
           </mc:Choice>
-          <mc:Fallback>
+          <mc:Fallback xmlns="">
             <p:sp>
               <p:nvSpPr>
                 <p:cNvPr id="104" name="TextBox 103"/>
@@ -42255,8 +41752,8 @@
               </p:nvSpPr>
               <p:spPr>
                 <a:xfrm rot="691448">
-                  <a:off x="3545135" y="2890729"/>
-                  <a:ext cx="412677" cy="246221"/>
+                  <a:off x="3551227" y="2890729"/>
+                  <a:ext cx="400494" cy="246221"/>
                 </a:xfrm>
                 <a:prstGeom prst="rect">
                   <a:avLst/>
@@ -42283,8 +41780,8 @@
             </p:sp>
           </mc:Fallback>
         </mc:AlternateContent>
-        <mc:AlternateContent xmlns:mc="http://schemas.openxmlformats.org/markup-compatibility/2006">
-          <mc:Choice xmlns:a14="http://schemas.microsoft.com/office/drawing/2010/main" Requires="a14">
+        <mc:AlternateContent xmlns:mc="http://schemas.openxmlformats.org/markup-compatibility/2006" xmlns:a14="http://schemas.microsoft.com/office/drawing/2010/main">
+          <mc:Choice Requires="a14">
             <p:sp>
               <p:nvSpPr>
                 <p:cNvPr id="105" name="TextBox 104"/>
@@ -42327,7 +41824,25 @@
                               <a:rPr lang="en-US" sz="1000" b="0" i="1" smtClean="0">
                                 <a:latin typeface="Cambria Math" panose="02040503050406030204" pitchFamily="18" charset="0"/>
                               </a:rPr>
-                              <m:t>0, 0, </m:t>
+                              <m:t>0</m:t>
+                            </m:r>
+                            <m:r>
+                              <a:rPr lang="en-US" sz="1000" b="0" i="1" smtClean="0">
+                                <a:latin typeface="Cambria Math" panose="02040503050406030204" pitchFamily="18" charset="0"/>
+                              </a:rPr>
+                              <m:t>, </m:t>
+                            </m:r>
+                            <m:r>
+                              <a:rPr lang="en-US" sz="1000" b="0" i="1" smtClean="0">
+                                <a:latin typeface="Cambria Math" panose="02040503050406030204" pitchFamily="18" charset="0"/>
+                              </a:rPr>
+                              <m:t>0</m:t>
+                            </m:r>
+                            <m:r>
+                              <a:rPr lang="en-US" sz="1000" b="0" i="1" smtClean="0">
+                                <a:latin typeface="Cambria Math" panose="02040503050406030204" pitchFamily="18" charset="0"/>
+                              </a:rPr>
+                              <m:t>, </m:t>
                             </m:r>
                             <m:sSubSup>
                               <m:sSubSupPr>
@@ -42338,12 +41853,24 @@
                                 </m:ctrlPr>
                               </m:sSubSupPr>
                               <m:e>
-                                <m:r>
-                                  <a:rPr lang="en-US" sz="1000" b="0" i="1" smtClean="0">
-                                    <a:latin typeface="Cambria Math" panose="02040503050406030204" pitchFamily="18" charset="0"/>
-                                  </a:rPr>
-                                  <m:t>𝑍</m:t>
-                                </m:r>
+                                <m:acc>
+                                  <m:accPr>
+                                    <m:chr m:val="́"/>
+                                    <m:ctrlPr>
+                                      <a:rPr lang="en-US" sz="1000" b="0" i="1" smtClean="0">
+                                        <a:latin typeface="Cambria Math" panose="02040503050406030204" pitchFamily="18" charset="0"/>
+                                      </a:rPr>
+                                    </m:ctrlPr>
+                                  </m:accPr>
+                                  <m:e>
+                                    <m:r>
+                                      <a:rPr lang="en-US" sz="1000" b="0" i="1" smtClean="0">
+                                        <a:latin typeface="Cambria Math" panose="02040503050406030204" pitchFamily="18" charset="0"/>
+                                      </a:rPr>
+                                      <m:t>𝑧</m:t>
+                                    </m:r>
+                                  </m:e>
+                                </m:acc>
                               </m:e>
                               <m:sub>
                                 <m:r>
@@ -42358,7 +41885,7 @@
                                   <a:rPr lang="en-US" sz="1000" b="0" i="1" smtClean="0">
                                     <a:latin typeface="Cambria Math" panose="02040503050406030204" pitchFamily="18" charset="0"/>
                                   </a:rPr>
-                                  <m:t>′</m:t>
+                                  <m:t> </m:t>
                                 </m:r>
                               </m:sup>
                             </m:sSubSup>
@@ -42372,7 +41899,7 @@
               </p:txBody>
             </p:sp>
           </mc:Choice>
-          <mc:Fallback>
+          <mc:Fallback xmlns="">
             <p:sp>
               <p:nvSpPr>
                 <p:cNvPr id="105" name="TextBox 104"/>
@@ -42392,7 +41919,7 @@
                 <a:blipFill rotWithShape="0">
                   <a:blip r:embed="rId8"/>
                   <a:stretch>
-                    <a:fillRect/>
+                    <a:fillRect r="-5263"/>
                   </a:stretch>
                 </a:blipFill>
               </p:spPr>

</xml_diff>